<commit_message>
updated the structure and reworked the text and images
</commit_message>
<xml_diff>
--- a/decision-graph-v3.pptx
+++ b/decision-graph-v3.pptx
@@ -6,6 +6,8 @@
   </p:sldMasterIdLst>
   <p:sldIdLst>
     <p:sldId id="261" r:id="rId2"/>
+    <p:sldId id="262" r:id="rId3"/>
+    <p:sldId id="263" r:id="rId4"/>
   </p:sldIdLst>
   <p:sldSz cx="12192000" cy="6858000"/>
   <p:notesSz cx="7315200" cy="9601200"/>
@@ -259,7 +261,7 @@
           <a:p>
             <a:fld id="{8BDBA34D-3A3B-4A08-BF5C-9660A308A6F1}" type="datetimeFigureOut">
               <a:rPr lang="en-US" smtClean="0"/>
-              <a:t>2/23/2015</a:t>
+              <a:t>3/1/2015</a:t>
             </a:fld>
             <a:endParaRPr lang="en-US"/>
           </a:p>
@@ -429,7 +431,7 @@
           <a:p>
             <a:fld id="{8BDBA34D-3A3B-4A08-BF5C-9660A308A6F1}" type="datetimeFigureOut">
               <a:rPr lang="en-US" smtClean="0"/>
-              <a:t>2/23/2015</a:t>
+              <a:t>3/1/2015</a:t>
             </a:fld>
             <a:endParaRPr lang="en-US"/>
           </a:p>
@@ -609,7 +611,7 @@
           <a:p>
             <a:fld id="{8BDBA34D-3A3B-4A08-BF5C-9660A308A6F1}" type="datetimeFigureOut">
               <a:rPr lang="en-US" smtClean="0"/>
-              <a:t>2/23/2015</a:t>
+              <a:t>3/1/2015</a:t>
             </a:fld>
             <a:endParaRPr lang="en-US"/>
           </a:p>
@@ -779,7 +781,7 @@
           <a:p>
             <a:fld id="{8BDBA34D-3A3B-4A08-BF5C-9660A308A6F1}" type="datetimeFigureOut">
               <a:rPr lang="en-US" smtClean="0"/>
-              <a:t>2/23/2015</a:t>
+              <a:t>3/1/2015</a:t>
             </a:fld>
             <a:endParaRPr lang="en-US"/>
           </a:p>
@@ -1025,7 +1027,7 @@
           <a:p>
             <a:fld id="{8BDBA34D-3A3B-4A08-BF5C-9660A308A6F1}" type="datetimeFigureOut">
               <a:rPr lang="en-US" smtClean="0"/>
-              <a:t>2/23/2015</a:t>
+              <a:t>3/1/2015</a:t>
             </a:fld>
             <a:endParaRPr lang="en-US"/>
           </a:p>
@@ -1257,7 +1259,7 @@
           <a:p>
             <a:fld id="{8BDBA34D-3A3B-4A08-BF5C-9660A308A6F1}" type="datetimeFigureOut">
               <a:rPr lang="en-US" smtClean="0"/>
-              <a:t>2/23/2015</a:t>
+              <a:t>3/1/2015</a:t>
             </a:fld>
             <a:endParaRPr lang="en-US"/>
           </a:p>
@@ -1624,7 +1626,7 @@
           <a:p>
             <a:fld id="{8BDBA34D-3A3B-4A08-BF5C-9660A308A6F1}" type="datetimeFigureOut">
               <a:rPr lang="en-US" smtClean="0"/>
-              <a:t>2/23/2015</a:t>
+              <a:t>3/1/2015</a:t>
             </a:fld>
             <a:endParaRPr lang="en-US"/>
           </a:p>
@@ -1742,7 +1744,7 @@
           <a:p>
             <a:fld id="{8BDBA34D-3A3B-4A08-BF5C-9660A308A6F1}" type="datetimeFigureOut">
               <a:rPr lang="en-US" smtClean="0"/>
-              <a:t>2/23/2015</a:t>
+              <a:t>3/1/2015</a:t>
             </a:fld>
             <a:endParaRPr lang="en-US"/>
           </a:p>
@@ -1837,7 +1839,7 @@
           <a:p>
             <a:fld id="{8BDBA34D-3A3B-4A08-BF5C-9660A308A6F1}" type="datetimeFigureOut">
               <a:rPr lang="en-US" smtClean="0"/>
-              <a:t>2/23/2015</a:t>
+              <a:t>3/1/2015</a:t>
             </a:fld>
             <a:endParaRPr lang="en-US"/>
           </a:p>
@@ -2114,7 +2116,7 @@
           <a:p>
             <a:fld id="{8BDBA34D-3A3B-4A08-BF5C-9660A308A6F1}" type="datetimeFigureOut">
               <a:rPr lang="en-US" smtClean="0"/>
-              <a:t>2/23/2015</a:t>
+              <a:t>3/1/2015</a:t>
             </a:fld>
             <a:endParaRPr lang="en-US"/>
           </a:p>
@@ -2367,7 +2369,7 @@
           <a:p>
             <a:fld id="{8BDBA34D-3A3B-4A08-BF5C-9660A308A6F1}" type="datetimeFigureOut">
               <a:rPr lang="en-US" smtClean="0"/>
-              <a:t>2/23/2015</a:t>
+              <a:t>3/1/2015</a:t>
             </a:fld>
             <a:endParaRPr lang="en-US"/>
           </a:p>
@@ -2580,7 +2582,7 @@
           <a:p>
             <a:fld id="{8BDBA34D-3A3B-4A08-BF5C-9660A308A6F1}" type="datetimeFigureOut">
               <a:rPr lang="en-US" smtClean="0"/>
-              <a:t>2/23/2015</a:t>
+              <a:t>3/1/2015</a:t>
             </a:fld>
             <a:endParaRPr lang="en-US"/>
           </a:p>
@@ -3377,6 +3379,1909 @@
           </a:fontRef>
         </p:style>
       </p:cxnSp>
+      <mc:AlternateContent xmlns:mc="http://schemas.openxmlformats.org/markup-compatibility/2006" xmlns:a14="http://schemas.microsoft.com/office/drawing/2010/main">
+        <mc:Choice Requires="a14">
+          <p:sp>
+            <p:nvSpPr>
+              <p:cNvPr id="70" name="Oval 69"/>
+              <p:cNvSpPr/>
+              <p:nvPr/>
+            </p:nvSpPr>
+            <p:spPr>
+              <a:xfrm>
+                <a:off x="5436241" y="1570401"/>
+                <a:ext cx="630595" cy="465221"/>
+              </a:xfrm>
+              <a:prstGeom prst="ellipse">
+                <a:avLst/>
+              </a:prstGeom>
+            </p:spPr>
+            <p:style>
+              <a:lnRef idx="2">
+                <a:schemeClr val="dk1"/>
+              </a:lnRef>
+              <a:fillRef idx="1">
+                <a:schemeClr val="lt1"/>
+              </a:fillRef>
+              <a:effectRef idx="0">
+                <a:schemeClr val="dk1"/>
+              </a:effectRef>
+              <a:fontRef idx="minor">
+                <a:schemeClr val="dk1"/>
+              </a:fontRef>
+            </p:style>
+            <p:txBody>
+              <a:bodyPr rtlCol="0" anchor="ctr"/>
+              <a:lstStyle/>
+              <a:p>
+                <a:pPr algn="ctr"/>
+                <a14:m>
+                  <m:oMathPara xmlns:m="http://schemas.openxmlformats.org/officeDocument/2006/math">
+                    <m:oMathParaPr>
+                      <m:jc m:val="centerGroup"/>
+                    </m:oMathParaPr>
+                    <m:oMath xmlns:m="http://schemas.openxmlformats.org/officeDocument/2006/math">
+                      <m:r>
+                        <a:rPr lang="en-US" sz="1000" b="0" i="1" smtClean="0">
+                          <a:solidFill>
+                            <a:schemeClr val="tx1"/>
+                          </a:solidFill>
+                          <a:latin typeface="Cambria Math" panose="02040503050406030204" pitchFamily="18" charset="0"/>
+                        </a:rPr>
+                        <m:t>𝐿𝑃</m:t>
+                      </m:r>
+                    </m:oMath>
+                  </m:oMathPara>
+                </a14:m>
+                <a:endParaRPr lang="en-US" sz="1000" dirty="0">
+                  <a:solidFill>
+                    <a:schemeClr val="tx1"/>
+                  </a:solidFill>
+                </a:endParaRPr>
+              </a:p>
+            </p:txBody>
+          </p:sp>
+        </mc:Choice>
+        <mc:Fallback xmlns="">
+          <p:sp>
+            <p:nvSpPr>
+              <p:cNvPr id="70" name="Oval 69"/>
+              <p:cNvSpPr>
+                <a:spLocks noRot="1" noChangeAspect="1" noMove="1" noResize="1" noEditPoints="1" noAdjustHandles="1" noChangeArrowheads="1" noChangeShapeType="1" noTextEdit="1"/>
+              </p:cNvSpPr>
+              <p:nvPr/>
+            </p:nvSpPr>
+            <p:spPr>
+              <a:xfrm>
+                <a:off x="5436241" y="1570401"/>
+                <a:ext cx="630595" cy="465221"/>
+              </a:xfrm>
+              <a:prstGeom prst="ellipse">
+                <a:avLst/>
+              </a:prstGeom>
+              <a:blipFill rotWithShape="0">
+                <a:blip r:embed="rId2"/>
+                <a:stretch>
+                  <a:fillRect/>
+                </a:stretch>
+              </a:blipFill>
+            </p:spPr>
+            <p:txBody>
+              <a:bodyPr/>
+              <a:lstStyle/>
+              <a:p>
+                <a:r>
+                  <a:rPr lang="en-US">
+                    <a:noFill/>
+                  </a:rPr>
+                  <a:t> </a:t>
+                </a:r>
+              </a:p>
+            </p:txBody>
+          </p:sp>
+        </mc:Fallback>
+      </mc:AlternateContent>
+      <mc:AlternateContent xmlns:mc="http://schemas.openxmlformats.org/markup-compatibility/2006" xmlns:a14="http://schemas.microsoft.com/office/drawing/2010/main">
+        <mc:Choice Requires="a14">
+          <p:sp>
+            <p:nvSpPr>
+              <p:cNvPr id="72" name="Diamond 71"/>
+              <p:cNvSpPr/>
+              <p:nvPr/>
+            </p:nvSpPr>
+            <p:spPr>
+              <a:xfrm>
+                <a:off x="5253091" y="3880099"/>
+                <a:ext cx="554789" cy="503352"/>
+              </a:xfrm>
+              <a:prstGeom prst="diamond">
+                <a:avLst/>
+              </a:prstGeom>
+            </p:spPr>
+            <p:style>
+              <a:lnRef idx="2">
+                <a:schemeClr val="dk1"/>
+              </a:lnRef>
+              <a:fillRef idx="1">
+                <a:schemeClr val="lt1"/>
+              </a:fillRef>
+              <a:effectRef idx="0">
+                <a:schemeClr val="dk1"/>
+              </a:effectRef>
+              <a:fontRef idx="minor">
+                <a:schemeClr val="dk1"/>
+              </a:fontRef>
+            </p:style>
+            <p:txBody>
+              <a:bodyPr rtlCol="0" anchor="ctr"/>
+              <a:lstStyle/>
+              <a:p>
+                <a:pPr algn="ctr"/>
+                <a14:m>
+                  <m:oMathPara xmlns:m="http://schemas.openxmlformats.org/officeDocument/2006/math">
+                    <m:oMathParaPr>
+                      <m:jc m:val="centerGroup"/>
+                    </m:oMathParaPr>
+                    <m:oMath xmlns:m="http://schemas.openxmlformats.org/officeDocument/2006/math">
+                      <m:r>
+                        <a:rPr lang="en-US" sz="1050" b="0" i="1" smtClean="0">
+                          <a:solidFill>
+                            <a:schemeClr val="tx1"/>
+                          </a:solidFill>
+                          <a:latin typeface="Cambria Math" panose="02040503050406030204" pitchFamily="18" charset="0"/>
+                        </a:rPr>
+                        <m:t>𝑈</m:t>
+                      </m:r>
+                    </m:oMath>
+                  </m:oMathPara>
+                </a14:m>
+                <a:endParaRPr lang="en-US" sz="1050" dirty="0">
+                  <a:solidFill>
+                    <a:schemeClr val="tx1"/>
+                  </a:solidFill>
+                </a:endParaRPr>
+              </a:p>
+            </p:txBody>
+          </p:sp>
+        </mc:Choice>
+        <mc:Fallback xmlns="">
+          <p:sp>
+            <p:nvSpPr>
+              <p:cNvPr id="72" name="Diamond 71"/>
+              <p:cNvSpPr>
+                <a:spLocks noRot="1" noChangeAspect="1" noMove="1" noResize="1" noEditPoints="1" noAdjustHandles="1" noChangeArrowheads="1" noChangeShapeType="1" noTextEdit="1"/>
+              </p:cNvSpPr>
+              <p:nvPr/>
+            </p:nvSpPr>
+            <p:spPr>
+              <a:xfrm>
+                <a:off x="5253091" y="3880099"/>
+                <a:ext cx="554789" cy="503352"/>
+              </a:xfrm>
+              <a:prstGeom prst="diamond">
+                <a:avLst/>
+              </a:prstGeom>
+              <a:blipFill rotWithShape="0">
+                <a:blip r:embed="rId3"/>
+                <a:stretch>
+                  <a:fillRect/>
+                </a:stretch>
+              </a:blipFill>
+            </p:spPr>
+            <p:txBody>
+              <a:bodyPr/>
+              <a:lstStyle/>
+              <a:p>
+                <a:r>
+                  <a:rPr lang="en-US">
+                    <a:noFill/>
+                  </a:rPr>
+                  <a:t> </a:t>
+                </a:r>
+              </a:p>
+            </p:txBody>
+          </p:sp>
+        </mc:Fallback>
+      </mc:AlternateContent>
+      <mc:AlternateContent xmlns:mc="http://schemas.openxmlformats.org/markup-compatibility/2006" xmlns:a14="http://schemas.microsoft.com/office/drawing/2010/main">
+        <mc:Choice Requires="a14">
+          <p:sp>
+            <p:nvSpPr>
+              <p:cNvPr id="102" name="Oval 101"/>
+              <p:cNvSpPr/>
+              <p:nvPr/>
+            </p:nvSpPr>
+            <p:spPr>
+              <a:xfrm>
+                <a:off x="2804136" y="2754874"/>
+                <a:ext cx="551635" cy="465221"/>
+              </a:xfrm>
+              <a:prstGeom prst="ellipse">
+                <a:avLst/>
+              </a:prstGeom>
+            </p:spPr>
+            <p:style>
+              <a:lnRef idx="2">
+                <a:schemeClr val="dk1"/>
+              </a:lnRef>
+              <a:fillRef idx="1">
+                <a:schemeClr val="lt1"/>
+              </a:fillRef>
+              <a:effectRef idx="0">
+                <a:schemeClr val="dk1"/>
+              </a:effectRef>
+              <a:fontRef idx="minor">
+                <a:schemeClr val="dk1"/>
+              </a:fontRef>
+            </p:style>
+            <p:txBody>
+              <a:bodyPr rtlCol="0" anchor="ctr"/>
+              <a:lstStyle/>
+              <a:p>
+                <a:pPr algn="ctr"/>
+                <a14:m>
+                  <m:oMathPara xmlns:m="http://schemas.openxmlformats.org/officeDocument/2006/math">
+                    <m:oMathParaPr>
+                      <m:jc m:val="centerGroup"/>
+                    </m:oMathParaPr>
+                    <m:oMath xmlns:m="http://schemas.openxmlformats.org/officeDocument/2006/math">
+                      <m:r>
+                        <a:rPr lang="en-US" sz="1000" i="1" smtClean="0">
+                          <a:solidFill>
+                            <a:schemeClr val="tx1"/>
+                          </a:solidFill>
+                          <a:latin typeface="Cambria Math" panose="02040503050406030204" pitchFamily="18" charset="0"/>
+                        </a:rPr>
+                        <m:t>𝑉</m:t>
+                      </m:r>
+                      <m:r>
+                        <a:rPr lang="en-US" sz="1000" b="0" i="1" smtClean="0">
+                          <a:solidFill>
+                            <a:schemeClr val="tx1"/>
+                          </a:solidFill>
+                          <a:latin typeface="Cambria Math" panose="02040503050406030204" pitchFamily="18" charset="0"/>
+                        </a:rPr>
+                        <m:t>𝑂</m:t>
+                      </m:r>
+                    </m:oMath>
+                  </m:oMathPara>
+                </a14:m>
+                <a:endParaRPr lang="en-US" sz="1000" dirty="0">
+                  <a:solidFill>
+                    <a:schemeClr val="tx1"/>
+                  </a:solidFill>
+                </a:endParaRPr>
+              </a:p>
+            </p:txBody>
+          </p:sp>
+        </mc:Choice>
+        <mc:Fallback xmlns="">
+          <p:sp>
+            <p:nvSpPr>
+              <p:cNvPr id="102" name="Oval 101"/>
+              <p:cNvSpPr>
+                <a:spLocks noRot="1" noChangeAspect="1" noMove="1" noResize="1" noEditPoints="1" noAdjustHandles="1" noChangeArrowheads="1" noChangeShapeType="1" noTextEdit="1"/>
+              </p:cNvSpPr>
+              <p:nvPr/>
+            </p:nvSpPr>
+            <p:spPr>
+              <a:xfrm>
+                <a:off x="2804136" y="2754874"/>
+                <a:ext cx="551635" cy="465221"/>
+              </a:xfrm>
+              <a:prstGeom prst="ellipse">
+                <a:avLst/>
+              </a:prstGeom>
+              <a:blipFill rotWithShape="0">
+                <a:blip r:embed="rId4"/>
+                <a:stretch>
+                  <a:fillRect/>
+                </a:stretch>
+              </a:blipFill>
+            </p:spPr>
+            <p:txBody>
+              <a:bodyPr/>
+              <a:lstStyle/>
+              <a:p>
+                <a:r>
+                  <a:rPr lang="en-US">
+                    <a:noFill/>
+                  </a:rPr>
+                  <a:t> </a:t>
+                </a:r>
+              </a:p>
+            </p:txBody>
+          </p:sp>
+        </mc:Fallback>
+      </mc:AlternateContent>
+      <p:cxnSp>
+        <p:nvCxnSpPr>
+          <p:cNvPr id="103" name="Straight Arrow Connector 102"/>
+          <p:cNvCxnSpPr>
+            <a:stCxn id="68" idx="4"/>
+            <a:endCxn id="102" idx="0"/>
+          </p:cNvCxnSpPr>
+          <p:nvPr/>
+        </p:nvCxnSpPr>
+        <p:spPr>
+          <a:xfrm flipH="1">
+            <a:off x="3079954" y="2050568"/>
+            <a:ext cx="718385" cy="704306"/>
+          </a:xfrm>
+          <a:prstGeom prst="straightConnector1">
+            <a:avLst/>
+          </a:prstGeom>
+          <a:ln w="38100">
+            <a:solidFill>
+              <a:schemeClr val="tx1">
+                <a:lumMod val="50000"/>
+                <a:lumOff val="50000"/>
+              </a:schemeClr>
+            </a:solidFill>
+            <a:headEnd type="none"/>
+            <a:tailEnd type="triangle" w="lg" len="med"/>
+          </a:ln>
+        </p:spPr>
+        <p:style>
+          <a:lnRef idx="1">
+            <a:schemeClr val="accent1"/>
+          </a:lnRef>
+          <a:fillRef idx="0">
+            <a:schemeClr val="accent1"/>
+          </a:fillRef>
+          <a:effectRef idx="0">
+            <a:schemeClr val="accent1"/>
+          </a:effectRef>
+          <a:fontRef idx="minor">
+            <a:schemeClr val="tx1"/>
+          </a:fontRef>
+        </p:style>
+      </p:cxnSp>
+      <mc:AlternateContent xmlns:mc="http://schemas.openxmlformats.org/markup-compatibility/2006" xmlns:a14="http://schemas.microsoft.com/office/drawing/2010/main">
+        <mc:Choice Requires="a14">
+          <p:sp>
+            <p:nvSpPr>
+              <p:cNvPr id="104" name="Oval 103"/>
+              <p:cNvSpPr/>
+              <p:nvPr/>
+            </p:nvSpPr>
+            <p:spPr>
+              <a:xfrm>
+                <a:off x="3544532" y="2754875"/>
+                <a:ext cx="574600" cy="465221"/>
+              </a:xfrm>
+              <a:prstGeom prst="ellipse">
+                <a:avLst/>
+              </a:prstGeom>
+            </p:spPr>
+            <p:style>
+              <a:lnRef idx="2">
+                <a:schemeClr val="dk1"/>
+              </a:lnRef>
+              <a:fillRef idx="1">
+                <a:schemeClr val="lt1"/>
+              </a:fillRef>
+              <a:effectRef idx="0">
+                <a:schemeClr val="dk1"/>
+              </a:effectRef>
+              <a:fontRef idx="minor">
+                <a:schemeClr val="dk1"/>
+              </a:fontRef>
+            </p:style>
+            <p:txBody>
+              <a:bodyPr rtlCol="0" anchor="ctr"/>
+              <a:lstStyle/>
+              <a:p>
+                <a:pPr algn="ctr"/>
+                <a14:m>
+                  <m:oMathPara xmlns:m="http://schemas.openxmlformats.org/officeDocument/2006/math">
+                    <m:oMathParaPr>
+                      <m:jc m:val="centerGroup"/>
+                    </m:oMathParaPr>
+                    <m:oMath xmlns:m="http://schemas.openxmlformats.org/officeDocument/2006/math">
+                      <m:r>
+                        <a:rPr lang="en-US" sz="1000" i="1" smtClean="0">
+                          <a:solidFill>
+                            <a:schemeClr val="tx1"/>
+                          </a:solidFill>
+                          <a:latin typeface="Cambria Math" panose="02040503050406030204" pitchFamily="18" charset="0"/>
+                        </a:rPr>
+                        <m:t>𝑅</m:t>
+                      </m:r>
+                      <m:r>
+                        <a:rPr lang="en-US" sz="1000" b="0" i="1" smtClean="0">
+                          <a:solidFill>
+                            <a:schemeClr val="tx1"/>
+                          </a:solidFill>
+                          <a:latin typeface="Cambria Math" panose="02040503050406030204" pitchFamily="18" charset="0"/>
+                        </a:rPr>
+                        <m:t>𝑂</m:t>
+                      </m:r>
+                    </m:oMath>
+                  </m:oMathPara>
+                </a14:m>
+                <a:endParaRPr lang="en-US" sz="1000" dirty="0">
+                  <a:solidFill>
+                    <a:schemeClr val="tx1"/>
+                  </a:solidFill>
+                </a:endParaRPr>
+              </a:p>
+            </p:txBody>
+          </p:sp>
+        </mc:Choice>
+        <mc:Fallback xmlns="">
+          <p:sp>
+            <p:nvSpPr>
+              <p:cNvPr id="104" name="Oval 103"/>
+              <p:cNvSpPr>
+                <a:spLocks noRot="1" noChangeAspect="1" noMove="1" noResize="1" noEditPoints="1" noAdjustHandles="1" noChangeArrowheads="1" noChangeShapeType="1" noTextEdit="1"/>
+              </p:cNvSpPr>
+              <p:nvPr/>
+            </p:nvSpPr>
+            <p:spPr>
+              <a:xfrm>
+                <a:off x="3544532" y="2754875"/>
+                <a:ext cx="574600" cy="465221"/>
+              </a:xfrm>
+              <a:prstGeom prst="ellipse">
+                <a:avLst/>
+              </a:prstGeom>
+              <a:blipFill rotWithShape="0">
+                <a:blip r:embed="rId5"/>
+                <a:stretch>
+                  <a:fillRect/>
+                </a:stretch>
+              </a:blipFill>
+            </p:spPr>
+            <p:txBody>
+              <a:bodyPr/>
+              <a:lstStyle/>
+              <a:p>
+                <a:r>
+                  <a:rPr lang="en-US">
+                    <a:noFill/>
+                  </a:rPr>
+                  <a:t> </a:t>
+                </a:r>
+              </a:p>
+            </p:txBody>
+          </p:sp>
+        </mc:Fallback>
+      </mc:AlternateContent>
+      <p:cxnSp>
+        <p:nvCxnSpPr>
+          <p:cNvPr id="105" name="Straight Arrow Connector 104"/>
+          <p:cNvCxnSpPr>
+            <a:stCxn id="68" idx="4"/>
+            <a:endCxn id="104" idx="0"/>
+          </p:cNvCxnSpPr>
+          <p:nvPr/>
+        </p:nvCxnSpPr>
+        <p:spPr>
+          <a:xfrm>
+            <a:off x="3798339" y="2050568"/>
+            <a:ext cx="33493" cy="704307"/>
+          </a:xfrm>
+          <a:prstGeom prst="straightConnector1">
+            <a:avLst/>
+          </a:prstGeom>
+          <a:ln w="38100">
+            <a:solidFill>
+              <a:schemeClr val="tx1">
+                <a:lumMod val="50000"/>
+                <a:lumOff val="50000"/>
+              </a:schemeClr>
+            </a:solidFill>
+            <a:headEnd type="none"/>
+            <a:tailEnd type="triangle" w="lg" len="med"/>
+          </a:ln>
+        </p:spPr>
+        <p:style>
+          <a:lnRef idx="1">
+            <a:schemeClr val="accent1"/>
+          </a:lnRef>
+          <a:fillRef idx="0">
+            <a:schemeClr val="accent1"/>
+          </a:fillRef>
+          <a:effectRef idx="0">
+            <a:schemeClr val="accent1"/>
+          </a:effectRef>
+          <a:fontRef idx="minor">
+            <a:schemeClr val="tx1"/>
+          </a:fontRef>
+        </p:style>
+      </p:cxnSp>
+      <p:cxnSp>
+        <p:nvCxnSpPr>
+          <p:cNvPr id="106" name="Straight Arrow Connector 105"/>
+          <p:cNvCxnSpPr>
+            <a:stCxn id="68" idx="4"/>
+            <a:endCxn id="72" idx="0"/>
+          </p:cNvCxnSpPr>
+          <p:nvPr/>
+        </p:nvCxnSpPr>
+        <p:spPr>
+          <a:xfrm>
+            <a:off x="3798339" y="2050568"/>
+            <a:ext cx="1732147" cy="1829531"/>
+          </a:xfrm>
+          <a:prstGeom prst="straightConnector1">
+            <a:avLst/>
+          </a:prstGeom>
+          <a:ln w="38100">
+            <a:solidFill>
+              <a:schemeClr val="tx1">
+                <a:lumMod val="50000"/>
+                <a:lumOff val="50000"/>
+              </a:schemeClr>
+            </a:solidFill>
+            <a:headEnd type="none"/>
+            <a:tailEnd type="triangle" w="lg" len="med"/>
+          </a:ln>
+        </p:spPr>
+        <p:style>
+          <a:lnRef idx="1">
+            <a:schemeClr val="accent1"/>
+          </a:lnRef>
+          <a:fillRef idx="0">
+            <a:schemeClr val="accent1"/>
+          </a:fillRef>
+          <a:effectRef idx="0">
+            <a:schemeClr val="accent1"/>
+          </a:effectRef>
+          <a:fontRef idx="minor">
+            <a:schemeClr val="tx1"/>
+          </a:fontRef>
+        </p:style>
+      </p:cxnSp>
+      <p:cxnSp>
+        <p:nvCxnSpPr>
+          <p:cNvPr id="107" name="Straight Arrow Connector 106"/>
+          <p:cNvCxnSpPr>
+            <a:stCxn id="66" idx="4"/>
+            <a:endCxn id="25" idx="7"/>
+          </p:cNvCxnSpPr>
+          <p:nvPr/>
+        </p:nvCxnSpPr>
+        <p:spPr>
+          <a:xfrm flipH="1">
+            <a:off x="6323650" y="2035622"/>
+            <a:ext cx="654506" cy="862084"/>
+          </a:xfrm>
+          <a:prstGeom prst="straightConnector1">
+            <a:avLst/>
+          </a:prstGeom>
+          <a:ln w="38100">
+            <a:solidFill>
+              <a:schemeClr val="tx1">
+                <a:lumMod val="50000"/>
+                <a:lumOff val="50000"/>
+              </a:schemeClr>
+            </a:solidFill>
+            <a:headEnd type="none"/>
+            <a:tailEnd type="triangle" w="lg" len="med"/>
+          </a:ln>
+        </p:spPr>
+        <p:style>
+          <a:lnRef idx="1">
+            <a:schemeClr val="accent1"/>
+          </a:lnRef>
+          <a:fillRef idx="0">
+            <a:schemeClr val="accent1"/>
+          </a:fillRef>
+          <a:effectRef idx="0">
+            <a:schemeClr val="accent1"/>
+          </a:effectRef>
+          <a:fontRef idx="minor">
+            <a:schemeClr val="tx1"/>
+          </a:fontRef>
+        </p:style>
+      </p:cxnSp>
+      <p:cxnSp>
+        <p:nvCxnSpPr>
+          <p:cNvPr id="108" name="Straight Arrow Connector 107"/>
+          <p:cNvCxnSpPr>
+            <a:stCxn id="67" idx="4"/>
+            <a:endCxn id="66" idx="1"/>
+          </p:cNvCxnSpPr>
+          <p:nvPr/>
+        </p:nvCxnSpPr>
+        <p:spPr>
+          <a:xfrm>
+            <a:off x="5868324" y="846594"/>
+            <a:ext cx="891121" cy="791937"/>
+          </a:xfrm>
+          <a:prstGeom prst="straightConnector1">
+            <a:avLst/>
+          </a:prstGeom>
+          <a:ln w="38100">
+            <a:solidFill>
+              <a:schemeClr val="tx1">
+                <a:lumMod val="50000"/>
+                <a:lumOff val="50000"/>
+              </a:schemeClr>
+            </a:solidFill>
+            <a:headEnd type="none"/>
+            <a:tailEnd type="triangle" w="lg" len="med"/>
+          </a:ln>
+        </p:spPr>
+        <p:style>
+          <a:lnRef idx="1">
+            <a:schemeClr val="accent1"/>
+          </a:lnRef>
+          <a:fillRef idx="0">
+            <a:schemeClr val="accent1"/>
+          </a:fillRef>
+          <a:effectRef idx="0">
+            <a:schemeClr val="accent1"/>
+          </a:effectRef>
+          <a:fontRef idx="minor">
+            <a:schemeClr val="tx1"/>
+          </a:fontRef>
+        </p:style>
+      </p:cxnSp>
+      <p:cxnSp>
+        <p:nvCxnSpPr>
+          <p:cNvPr id="109" name="Straight Arrow Connector 108"/>
+          <p:cNvCxnSpPr>
+            <a:stCxn id="65" idx="4"/>
+            <a:endCxn id="66" idx="0"/>
+          </p:cNvCxnSpPr>
+          <p:nvPr/>
+        </p:nvCxnSpPr>
+        <p:spPr>
+          <a:xfrm>
+            <a:off x="6902193" y="846595"/>
+            <a:ext cx="75963" cy="723806"/>
+          </a:xfrm>
+          <a:prstGeom prst="straightConnector1">
+            <a:avLst/>
+          </a:prstGeom>
+          <a:ln w="38100">
+            <a:solidFill>
+              <a:schemeClr val="tx1">
+                <a:lumMod val="50000"/>
+                <a:lumOff val="50000"/>
+              </a:schemeClr>
+            </a:solidFill>
+            <a:headEnd type="none"/>
+            <a:tailEnd type="triangle" w="lg" len="med"/>
+          </a:ln>
+        </p:spPr>
+        <p:style>
+          <a:lnRef idx="1">
+            <a:schemeClr val="accent1"/>
+          </a:lnRef>
+          <a:fillRef idx="0">
+            <a:schemeClr val="accent1"/>
+          </a:fillRef>
+          <a:effectRef idx="0">
+            <a:schemeClr val="accent1"/>
+          </a:effectRef>
+          <a:fontRef idx="minor">
+            <a:schemeClr val="tx1"/>
+          </a:fontRef>
+        </p:style>
+      </p:cxnSp>
+      <p:cxnSp>
+        <p:nvCxnSpPr>
+          <p:cNvPr id="111" name="Straight Arrow Connector 110"/>
+          <p:cNvCxnSpPr>
+            <a:stCxn id="64" idx="4"/>
+            <a:endCxn id="66" idx="7"/>
+          </p:cNvCxnSpPr>
+          <p:nvPr/>
+        </p:nvCxnSpPr>
+        <p:spPr>
+          <a:xfrm flipH="1">
+            <a:off x="7196867" y="846595"/>
+            <a:ext cx="558570" cy="791936"/>
+          </a:xfrm>
+          <a:prstGeom prst="straightConnector1">
+            <a:avLst/>
+          </a:prstGeom>
+          <a:ln w="38100">
+            <a:solidFill>
+              <a:schemeClr val="tx1">
+                <a:lumMod val="50000"/>
+                <a:lumOff val="50000"/>
+              </a:schemeClr>
+            </a:solidFill>
+            <a:headEnd type="none"/>
+            <a:tailEnd type="triangle" w="lg" len="med"/>
+          </a:ln>
+        </p:spPr>
+        <p:style>
+          <a:lnRef idx="1">
+            <a:schemeClr val="accent1"/>
+          </a:lnRef>
+          <a:fillRef idx="0">
+            <a:schemeClr val="accent1"/>
+          </a:fillRef>
+          <a:effectRef idx="0">
+            <a:schemeClr val="accent1"/>
+          </a:effectRef>
+          <a:fontRef idx="minor">
+            <a:schemeClr val="tx1"/>
+          </a:fontRef>
+        </p:style>
+      </p:cxnSp>
+      <p:cxnSp>
+        <p:nvCxnSpPr>
+          <p:cNvPr id="114" name="Straight Arrow Connector 113"/>
+          <p:cNvCxnSpPr>
+            <a:stCxn id="70" idx="4"/>
+            <a:endCxn id="25" idx="0"/>
+          </p:cNvCxnSpPr>
+          <p:nvPr/>
+        </p:nvCxnSpPr>
+        <p:spPr>
+          <a:xfrm>
+            <a:off x="5751539" y="2035622"/>
+            <a:ext cx="337852" cy="793954"/>
+          </a:xfrm>
+          <a:prstGeom prst="straightConnector1">
+            <a:avLst/>
+          </a:prstGeom>
+          <a:ln w="38100">
+            <a:solidFill>
+              <a:schemeClr val="tx1">
+                <a:lumMod val="50000"/>
+                <a:lumOff val="50000"/>
+              </a:schemeClr>
+            </a:solidFill>
+            <a:headEnd type="none"/>
+            <a:tailEnd type="triangle" w="lg" len="med"/>
+          </a:ln>
+        </p:spPr>
+        <p:style>
+          <a:lnRef idx="1">
+            <a:schemeClr val="accent1"/>
+          </a:lnRef>
+          <a:fillRef idx="0">
+            <a:schemeClr val="accent1"/>
+          </a:fillRef>
+          <a:effectRef idx="0">
+            <a:schemeClr val="accent1"/>
+          </a:effectRef>
+          <a:fontRef idx="minor">
+            <a:schemeClr val="tx1"/>
+          </a:fontRef>
+        </p:style>
+      </p:cxnSp>
+      <p:cxnSp>
+        <p:nvCxnSpPr>
+          <p:cNvPr id="115" name="Straight Arrow Connector 114"/>
+          <p:cNvCxnSpPr>
+            <a:stCxn id="25" idx="4"/>
+            <a:endCxn id="72" idx="0"/>
+          </p:cNvCxnSpPr>
+          <p:nvPr/>
+        </p:nvCxnSpPr>
+        <p:spPr>
+          <a:xfrm flipH="1">
+            <a:off x="5530486" y="3294797"/>
+            <a:ext cx="558905" cy="585302"/>
+          </a:xfrm>
+          <a:prstGeom prst="straightConnector1">
+            <a:avLst/>
+          </a:prstGeom>
+          <a:ln w="38100">
+            <a:solidFill>
+              <a:schemeClr val="tx1">
+                <a:lumMod val="50000"/>
+                <a:lumOff val="50000"/>
+              </a:schemeClr>
+            </a:solidFill>
+            <a:headEnd type="none"/>
+            <a:tailEnd type="triangle" w="lg" len="med"/>
+          </a:ln>
+        </p:spPr>
+        <p:style>
+          <a:lnRef idx="1">
+            <a:schemeClr val="accent1"/>
+          </a:lnRef>
+          <a:fillRef idx="0">
+            <a:schemeClr val="accent1"/>
+          </a:fillRef>
+          <a:effectRef idx="0">
+            <a:schemeClr val="accent1"/>
+          </a:effectRef>
+          <a:fontRef idx="minor">
+            <a:schemeClr val="tx1"/>
+          </a:fontRef>
+        </p:style>
+      </p:cxnSp>
+      <p:sp>
+        <p:nvSpPr>
+          <p:cNvPr id="25" name="Oval 24"/>
+          <p:cNvSpPr/>
+          <p:nvPr/>
+        </p:nvSpPr>
+        <p:spPr>
+          <a:xfrm>
+            <a:off x="5758098" y="2829576"/>
+            <a:ext cx="662585" cy="465221"/>
+          </a:xfrm>
+          <a:prstGeom prst="ellipse">
+            <a:avLst/>
+          </a:prstGeom>
+        </p:spPr>
+        <p:style>
+          <a:lnRef idx="2">
+            <a:schemeClr val="dk1"/>
+          </a:lnRef>
+          <a:fillRef idx="1">
+            <a:schemeClr val="lt1"/>
+          </a:fillRef>
+          <a:effectRef idx="0">
+            <a:schemeClr val="dk1"/>
+          </a:effectRef>
+          <a:fontRef idx="minor">
+            <a:schemeClr val="dk1"/>
+          </a:fontRef>
+        </p:style>
+        <p:txBody>
+          <a:bodyPr rtlCol="0" anchor="ctr"/>
+          <a:lstStyle/>
+          <a:p>
+            <a:pPr algn="ctr"/>
+            <a:r>
+              <a:rPr lang="en-US" sz="1000" dirty="0" smtClean="0">
+                <a:solidFill>
+                  <a:schemeClr val="tx1"/>
+                </a:solidFill>
+              </a:rPr>
+              <a:t>IA</a:t>
+            </a:r>
+            <a:endParaRPr lang="en-US" sz="1000" dirty="0">
+              <a:solidFill>
+                <a:schemeClr val="tx1"/>
+              </a:solidFill>
+            </a:endParaRPr>
+          </a:p>
+        </p:txBody>
+      </p:sp>
+      <p:sp>
+        <p:nvSpPr>
+          <p:cNvPr id="9" name="Rectangle 8"/>
+          <p:cNvSpPr/>
+          <p:nvPr/>
+        </p:nvSpPr>
+        <p:spPr>
+          <a:xfrm>
+            <a:off x="6135728" y="3926033"/>
+            <a:ext cx="721291" cy="411483"/>
+          </a:xfrm>
+          <a:prstGeom prst="rect">
+            <a:avLst/>
+          </a:prstGeom>
+        </p:spPr>
+        <p:style>
+          <a:lnRef idx="2">
+            <a:schemeClr val="dk1"/>
+          </a:lnRef>
+          <a:fillRef idx="1">
+            <a:schemeClr val="lt1"/>
+          </a:fillRef>
+          <a:effectRef idx="0">
+            <a:schemeClr val="dk1"/>
+          </a:effectRef>
+          <a:fontRef idx="minor">
+            <a:schemeClr val="dk1"/>
+          </a:fontRef>
+        </p:style>
+        <p:txBody>
+          <a:bodyPr rtlCol="0" anchor="ctr"/>
+          <a:lstStyle/>
+          <a:p>
+            <a:pPr algn="ctr"/>
+            <a:r>
+              <a:rPr lang="en-US" sz="1200" dirty="0" smtClean="0">
+                <a:solidFill>
+                  <a:schemeClr val="tx1"/>
+                </a:solidFill>
+              </a:rPr>
+              <a:t>D</a:t>
+            </a:r>
+            <a:endParaRPr lang="en-US" sz="1200" dirty="0">
+              <a:solidFill>
+                <a:schemeClr val="tx1"/>
+              </a:solidFill>
+            </a:endParaRPr>
+          </a:p>
+        </p:txBody>
+      </p:sp>
+      <p:cxnSp>
+        <p:nvCxnSpPr>
+          <p:cNvPr id="33" name="Straight Arrow Connector 32"/>
+          <p:cNvCxnSpPr>
+            <a:stCxn id="25" idx="4"/>
+            <a:endCxn id="9" idx="0"/>
+          </p:cNvCxnSpPr>
+          <p:nvPr/>
+        </p:nvCxnSpPr>
+        <p:spPr>
+          <a:xfrm>
+            <a:off x="6089391" y="3294797"/>
+            <a:ext cx="406983" cy="631236"/>
+          </a:xfrm>
+          <a:prstGeom prst="straightConnector1">
+            <a:avLst/>
+          </a:prstGeom>
+          <a:ln w="38100">
+            <a:solidFill>
+              <a:schemeClr val="tx1">
+                <a:lumMod val="50000"/>
+                <a:lumOff val="50000"/>
+              </a:schemeClr>
+            </a:solidFill>
+            <a:headEnd type="none"/>
+            <a:tailEnd type="triangle" w="lg" len="med"/>
+          </a:ln>
+        </p:spPr>
+        <p:style>
+          <a:lnRef idx="1">
+            <a:schemeClr val="accent1"/>
+          </a:lnRef>
+          <a:fillRef idx="0">
+            <a:schemeClr val="accent1"/>
+          </a:fillRef>
+          <a:effectRef idx="0">
+            <a:schemeClr val="accent1"/>
+          </a:effectRef>
+          <a:fontRef idx="minor">
+            <a:schemeClr val="tx1"/>
+          </a:fontRef>
+        </p:style>
+      </p:cxnSp>
+      <p:cxnSp>
+        <p:nvCxnSpPr>
+          <p:cNvPr id="42" name="Straight Arrow Connector 41"/>
+          <p:cNvCxnSpPr>
+            <a:stCxn id="70" idx="4"/>
+            <a:endCxn id="72" idx="0"/>
+          </p:cNvCxnSpPr>
+          <p:nvPr/>
+        </p:nvCxnSpPr>
+        <p:spPr>
+          <a:xfrm flipH="1">
+            <a:off x="5530486" y="2035622"/>
+            <a:ext cx="221053" cy="1844477"/>
+          </a:xfrm>
+          <a:prstGeom prst="straightConnector1">
+            <a:avLst/>
+          </a:prstGeom>
+          <a:ln w="38100">
+            <a:solidFill>
+              <a:schemeClr val="tx1">
+                <a:lumMod val="50000"/>
+                <a:lumOff val="50000"/>
+              </a:schemeClr>
+            </a:solidFill>
+            <a:headEnd type="none"/>
+            <a:tailEnd type="triangle" w="lg" len="med"/>
+          </a:ln>
+        </p:spPr>
+        <p:style>
+          <a:lnRef idx="1">
+            <a:schemeClr val="accent1"/>
+          </a:lnRef>
+          <a:fillRef idx="0">
+            <a:schemeClr val="accent1"/>
+          </a:fillRef>
+          <a:effectRef idx="0">
+            <a:schemeClr val="accent1"/>
+          </a:effectRef>
+          <a:fontRef idx="minor">
+            <a:schemeClr val="tx1"/>
+          </a:fontRef>
+        </p:style>
+      </p:cxnSp>
+      <p:sp>
+        <p:nvSpPr>
+          <p:cNvPr id="83" name="Oval 82"/>
+          <p:cNvSpPr/>
+          <p:nvPr/>
+        </p:nvSpPr>
+        <p:spPr>
+          <a:xfrm>
+            <a:off x="4486951" y="1581233"/>
+            <a:ext cx="570722" cy="465221"/>
+          </a:xfrm>
+          <a:prstGeom prst="ellipse">
+            <a:avLst/>
+          </a:prstGeom>
+        </p:spPr>
+        <p:style>
+          <a:lnRef idx="2">
+            <a:schemeClr val="dk1"/>
+          </a:lnRef>
+          <a:fillRef idx="1">
+            <a:schemeClr val="lt1"/>
+          </a:fillRef>
+          <a:effectRef idx="0">
+            <a:schemeClr val="dk1"/>
+          </a:effectRef>
+          <a:fontRef idx="minor">
+            <a:schemeClr val="dk1"/>
+          </a:fontRef>
+        </p:style>
+        <p:txBody>
+          <a:bodyPr rtlCol="0" anchor="ctr"/>
+          <a:lstStyle/>
+          <a:p>
+            <a:pPr algn="ctr"/>
+            <a:r>
+              <a:rPr lang="en-US" sz="1000" dirty="0" smtClean="0">
+                <a:solidFill>
+                  <a:schemeClr val="tx1"/>
+                </a:solidFill>
+              </a:rPr>
+              <a:t>B</a:t>
+            </a:r>
+            <a:endParaRPr lang="en-US" sz="1000" dirty="0">
+              <a:solidFill>
+                <a:schemeClr val="tx1"/>
+              </a:solidFill>
+            </a:endParaRPr>
+          </a:p>
+        </p:txBody>
+      </p:sp>
+      <p:cxnSp>
+        <p:nvCxnSpPr>
+          <p:cNvPr id="84" name="Straight Arrow Connector 83"/>
+          <p:cNvCxnSpPr>
+            <a:stCxn id="83" idx="4"/>
+            <a:endCxn id="25" idx="0"/>
+          </p:cNvCxnSpPr>
+          <p:nvPr/>
+        </p:nvCxnSpPr>
+        <p:spPr>
+          <a:xfrm>
+            <a:off x="4772312" y="2046454"/>
+            <a:ext cx="1317079" cy="783122"/>
+          </a:xfrm>
+          <a:prstGeom prst="straightConnector1">
+            <a:avLst/>
+          </a:prstGeom>
+          <a:ln w="38100">
+            <a:solidFill>
+              <a:schemeClr val="tx1">
+                <a:lumMod val="50000"/>
+                <a:lumOff val="50000"/>
+              </a:schemeClr>
+            </a:solidFill>
+            <a:headEnd type="none"/>
+            <a:tailEnd type="triangle" w="lg" len="med"/>
+          </a:ln>
+        </p:spPr>
+        <p:style>
+          <a:lnRef idx="1">
+            <a:schemeClr val="accent1"/>
+          </a:lnRef>
+          <a:fillRef idx="0">
+            <a:schemeClr val="accent1"/>
+          </a:fillRef>
+          <a:effectRef idx="0">
+            <a:schemeClr val="accent1"/>
+          </a:effectRef>
+          <a:fontRef idx="minor">
+            <a:schemeClr val="tx1"/>
+          </a:fontRef>
+        </p:style>
+      </p:cxnSp>
+      <mc:AlternateContent xmlns:mc="http://schemas.openxmlformats.org/markup-compatibility/2006" xmlns:a14="http://schemas.microsoft.com/office/drawing/2010/main">
+        <mc:Choice Requires="a14">
+          <p:sp>
+            <p:nvSpPr>
+              <p:cNvPr id="74" name="TextBox 73"/>
+              <p:cNvSpPr txBox="1"/>
+              <p:nvPr/>
+            </p:nvSpPr>
+            <p:spPr>
+              <a:xfrm>
+                <a:off x="2950648" y="4882341"/>
+                <a:ext cx="4834336" cy="276999"/>
+              </a:xfrm>
+              <a:prstGeom prst="rect">
+                <a:avLst/>
+              </a:prstGeom>
+              <a:noFill/>
+            </p:spPr>
+            <p:txBody>
+              <a:bodyPr wrap="none" lIns="0" tIns="0" rIns="0" bIns="0" rtlCol="0">
+                <a:spAutoFit/>
+              </a:bodyPr>
+              <a:lstStyle/>
+              <a:p>
+                <a:pPr/>
+                <a14:m>
+                  <m:oMathPara xmlns:m="http://schemas.openxmlformats.org/officeDocument/2006/math">
+                    <m:oMathParaPr>
+                      <m:jc m:val="centerGroup"/>
+                    </m:oMathParaPr>
+                    <m:oMath xmlns:m="http://schemas.openxmlformats.org/officeDocument/2006/math">
+                      <m:r>
+                        <a:rPr lang="en-US" b="0" i="1" smtClean="0">
+                          <a:latin typeface="Cambria Math" panose="02040503050406030204" pitchFamily="18" charset="0"/>
+                        </a:rPr>
+                        <m:t>𝑈</m:t>
+                      </m:r>
+                      <m:d>
+                        <m:dPr>
+                          <m:ctrlPr>
+                            <a:rPr lang="en-US" b="0" i="1" smtClean="0">
+                              <a:latin typeface="Cambria Math" panose="02040503050406030204" pitchFamily="18" charset="0"/>
+                            </a:rPr>
+                          </m:ctrlPr>
+                        </m:dPr>
+                        <m:e>
+                          <m:r>
+                            <a:rPr lang="en-US" b="0" i="1" smtClean="0">
+                              <a:latin typeface="Cambria Math" panose="02040503050406030204" pitchFamily="18" charset="0"/>
+                            </a:rPr>
+                            <m:t>𝐿𝑆</m:t>
+                          </m:r>
+                          <m:r>
+                            <a:rPr lang="en-US" b="0" i="1" smtClean="0">
+                              <a:latin typeface="Cambria Math" panose="02040503050406030204" pitchFamily="18" charset="0"/>
+                            </a:rPr>
+                            <m:t>,</m:t>
+                          </m:r>
+                          <m:r>
+                            <a:rPr lang="en-US" b="0" i="1" smtClean="0">
+                              <a:latin typeface="Cambria Math" panose="02040503050406030204" pitchFamily="18" charset="0"/>
+                            </a:rPr>
+                            <m:t>𝐿𝑃</m:t>
+                          </m:r>
+                          <m:r>
+                            <a:rPr lang="en-US" b="0" i="1" smtClean="0">
+                              <a:latin typeface="Cambria Math" panose="02040503050406030204" pitchFamily="18" charset="0"/>
+                            </a:rPr>
+                            <m:t>,</m:t>
+                          </m:r>
+                          <m:r>
+                            <a:rPr lang="en-US" b="0" i="1" smtClean="0">
+                              <a:latin typeface="Cambria Math" panose="02040503050406030204" pitchFamily="18" charset="0"/>
+                            </a:rPr>
+                            <m:t>𝐼𝐴</m:t>
+                          </m:r>
+                        </m:e>
+                      </m:d>
+                      <m:r>
+                        <a:rPr lang="en-US" b="0" i="1" smtClean="0">
+                          <a:latin typeface="Cambria Math" panose="02040503050406030204" pitchFamily="18" charset="0"/>
+                        </a:rPr>
+                        <m:t>=−</m:t>
+                      </m:r>
+                      <m:d>
+                        <m:dPr>
+                          <m:ctrlPr>
+                            <a:rPr lang="en-US" b="0" i="1" smtClean="0">
+                              <a:latin typeface="Cambria Math" panose="02040503050406030204" pitchFamily="18" charset="0"/>
+                            </a:rPr>
+                          </m:ctrlPr>
+                        </m:dPr>
+                        <m:e>
+                          <m:r>
+                            <a:rPr lang="en-US" b="0" i="1" smtClean="0">
+                              <a:latin typeface="Cambria Math" panose="02040503050406030204" pitchFamily="18" charset="0"/>
+                            </a:rPr>
+                            <m:t>1−</m:t>
+                          </m:r>
+                          <m:r>
+                            <a:rPr lang="en-US" b="0" i="1" smtClean="0">
+                              <a:latin typeface="Cambria Math" panose="02040503050406030204" pitchFamily="18" charset="0"/>
+                            </a:rPr>
+                            <m:t>𝛼</m:t>
+                          </m:r>
+                        </m:e>
+                      </m:d>
+                      <m:r>
+                        <a:rPr lang="en-US" b="0" i="1" smtClean="0">
+                          <a:latin typeface="Cambria Math" panose="02040503050406030204" pitchFamily="18" charset="0"/>
+                        </a:rPr>
+                        <m:t>𝑑</m:t>
+                      </m:r>
+                      <m:d>
+                        <m:dPr>
+                          <m:ctrlPr>
+                            <a:rPr lang="en-US" b="0" i="1" smtClean="0">
+                              <a:latin typeface="Cambria Math" panose="02040503050406030204" pitchFamily="18" charset="0"/>
+                            </a:rPr>
+                          </m:ctrlPr>
+                        </m:dPr>
+                        <m:e>
+                          <m:r>
+                            <a:rPr lang="en-US" b="0" i="1" smtClean="0">
+                              <a:latin typeface="Cambria Math" panose="02040503050406030204" pitchFamily="18" charset="0"/>
+                            </a:rPr>
+                            <m:t>𝐿𝑆</m:t>
+                          </m:r>
+                          <m:r>
+                            <a:rPr lang="en-US" b="0" i="1" smtClean="0">
+                              <a:latin typeface="Cambria Math" panose="02040503050406030204" pitchFamily="18" charset="0"/>
+                            </a:rPr>
+                            <m:t>,</m:t>
+                          </m:r>
+                          <m:r>
+                            <a:rPr lang="en-US" b="0" i="1" smtClean="0">
+                              <a:latin typeface="Cambria Math" panose="02040503050406030204" pitchFamily="18" charset="0"/>
+                            </a:rPr>
+                            <m:t>𝐿𝑃</m:t>
+                          </m:r>
+                        </m:e>
+                      </m:d>
+                      <m:r>
+                        <a:rPr lang="en-US" b="0" i="1" smtClean="0">
+                          <a:latin typeface="Cambria Math" panose="02040503050406030204" pitchFamily="18" charset="0"/>
+                        </a:rPr>
+                        <m:t>−</m:t>
+                      </m:r>
+                      <m:r>
+                        <a:rPr lang="en-US" b="0" i="1" smtClean="0">
+                          <a:latin typeface="Cambria Math" panose="02040503050406030204" pitchFamily="18" charset="0"/>
+                        </a:rPr>
+                        <m:t>𝛼</m:t>
+                      </m:r>
+                      <m:r>
+                        <a:rPr lang="en-US" b="0" i="1" smtClean="0">
+                          <a:latin typeface="Cambria Math" panose="02040503050406030204" pitchFamily="18" charset="0"/>
+                        </a:rPr>
+                        <m:t>𝑑</m:t>
+                      </m:r>
+                      <m:r>
+                        <a:rPr lang="en-US" b="0" i="1" smtClean="0">
+                          <a:latin typeface="Cambria Math" panose="02040503050406030204" pitchFamily="18" charset="0"/>
+                        </a:rPr>
+                        <m:t>(</m:t>
+                      </m:r>
+                      <m:r>
+                        <a:rPr lang="en-US" b="0" i="1" smtClean="0">
+                          <a:latin typeface="Cambria Math" panose="02040503050406030204" pitchFamily="18" charset="0"/>
+                        </a:rPr>
+                        <m:t>𝐼𝐴</m:t>
+                      </m:r>
+                      <m:r>
+                        <a:rPr lang="en-US" b="0" i="1" smtClean="0">
+                          <a:latin typeface="Cambria Math" panose="02040503050406030204" pitchFamily="18" charset="0"/>
+                        </a:rPr>
+                        <m:t>,</m:t>
+                      </m:r>
+                      <m:r>
+                        <a:rPr lang="en-US" b="0" i="1" smtClean="0">
+                          <a:latin typeface="Cambria Math" panose="02040503050406030204" pitchFamily="18" charset="0"/>
+                        </a:rPr>
+                        <m:t>𝐿𝑃</m:t>
+                      </m:r>
+                      <m:r>
+                        <a:rPr lang="en-US" b="0" i="1" smtClean="0">
+                          <a:latin typeface="Cambria Math" panose="02040503050406030204" pitchFamily="18" charset="0"/>
+                        </a:rPr>
+                        <m:t>)</m:t>
+                      </m:r>
+                    </m:oMath>
+                  </m:oMathPara>
+                </a14:m>
+                <a:endParaRPr lang="en-US" dirty="0"/>
+              </a:p>
+            </p:txBody>
+          </p:sp>
+        </mc:Choice>
+        <mc:Fallback xmlns="">
+          <p:sp>
+            <p:nvSpPr>
+              <p:cNvPr id="74" name="TextBox 73"/>
+              <p:cNvSpPr txBox="1">
+                <a:spLocks noRot="1" noChangeAspect="1" noMove="1" noResize="1" noEditPoints="1" noAdjustHandles="1" noChangeArrowheads="1" noChangeShapeType="1" noTextEdit="1"/>
+              </p:cNvSpPr>
+              <p:nvPr/>
+            </p:nvSpPr>
+            <p:spPr>
+              <a:xfrm>
+                <a:off x="2950648" y="4882341"/>
+                <a:ext cx="4834336" cy="276999"/>
+              </a:xfrm>
+              <a:prstGeom prst="rect">
+                <a:avLst/>
+              </a:prstGeom>
+              <a:blipFill rotWithShape="0">
+                <a:blip r:embed="rId6"/>
+                <a:stretch>
+                  <a:fillRect l="-631" t="-2222" r="-1261" b="-35556"/>
+                </a:stretch>
+              </a:blipFill>
+            </p:spPr>
+            <p:txBody>
+              <a:bodyPr/>
+              <a:lstStyle/>
+              <a:p>
+                <a:r>
+                  <a:rPr lang="en-US">
+                    <a:noFill/>
+                  </a:rPr>
+                  <a:t> </a:t>
+                </a:r>
+              </a:p>
+            </p:txBody>
+          </p:sp>
+        </mc:Fallback>
+      </mc:AlternateContent>
+      <mc:AlternateContent xmlns:mc="http://schemas.openxmlformats.org/markup-compatibility/2006" xmlns:a14="http://schemas.microsoft.com/office/drawing/2010/main">
+        <mc:Choice Requires="a14">
+          <p:sp>
+            <p:nvSpPr>
+              <p:cNvPr id="75" name="TextBox 74"/>
+              <p:cNvSpPr txBox="1"/>
+              <p:nvPr/>
+            </p:nvSpPr>
+            <p:spPr>
+              <a:xfrm>
+                <a:off x="2370171" y="5301390"/>
+                <a:ext cx="6541682" cy="1200329"/>
+              </a:xfrm>
+              <a:prstGeom prst="rect">
+                <a:avLst/>
+              </a:prstGeom>
+              <a:noFill/>
+            </p:spPr>
+            <p:txBody>
+              <a:bodyPr wrap="square" rtlCol="0">
+                <a:spAutoFit/>
+              </a:bodyPr>
+              <a:lstStyle/>
+              <a:p>
+                <a14:m>
+                  <m:oMath xmlns:m="http://schemas.openxmlformats.org/officeDocument/2006/math">
+                    <m:r>
+                      <a:rPr lang="en-US" b="0" i="1" smtClean="0">
+                        <a:latin typeface="Cambria Math" panose="02040503050406030204" pitchFamily="18" charset="0"/>
+                      </a:rPr>
+                      <m:t>𝛼</m:t>
+                    </m:r>
+                  </m:oMath>
+                </a14:m>
+                <a:r>
+                  <a:rPr lang="en-US" dirty="0" smtClean="0"/>
+                  <a:t> in the utility function is used to weight the utility such that either decisions are more supportive towards chasing the smuggler or towards strategic positioning to rendezvous with the smuggler. The choice of </a:t>
+                </a:r>
+                <a14:m>
+                  <m:oMath xmlns:m="http://schemas.openxmlformats.org/officeDocument/2006/math">
+                    <m:r>
+                      <a:rPr lang="en-US" i="1">
+                        <a:latin typeface="Cambria Math" panose="02040503050406030204" pitchFamily="18" charset="0"/>
+                      </a:rPr>
+                      <m:t>𝛼</m:t>
+                    </m:r>
+                  </m:oMath>
+                </a14:m>
+                <a:r>
+                  <a:rPr lang="en-US" dirty="0" smtClean="0"/>
+                  <a:t> depends on the domain and the available observations</a:t>
+                </a:r>
+                <a:endParaRPr lang="en-US" dirty="0"/>
+              </a:p>
+            </p:txBody>
+          </p:sp>
+        </mc:Choice>
+        <mc:Fallback xmlns="">
+          <p:sp>
+            <p:nvSpPr>
+              <p:cNvPr id="75" name="TextBox 74"/>
+              <p:cNvSpPr txBox="1">
+                <a:spLocks noRot="1" noChangeAspect="1" noMove="1" noResize="1" noEditPoints="1" noAdjustHandles="1" noChangeArrowheads="1" noChangeShapeType="1" noTextEdit="1"/>
+              </p:cNvSpPr>
+              <p:nvPr/>
+            </p:nvSpPr>
+            <p:spPr>
+              <a:xfrm>
+                <a:off x="2370171" y="5301390"/>
+                <a:ext cx="6541682" cy="1200329"/>
+              </a:xfrm>
+              <a:prstGeom prst="rect">
+                <a:avLst/>
+              </a:prstGeom>
+              <a:blipFill rotWithShape="0">
+                <a:blip r:embed="rId7"/>
+                <a:stretch>
+                  <a:fillRect l="-839" t="-3046" b="-7107"/>
+                </a:stretch>
+              </a:blipFill>
+            </p:spPr>
+            <p:txBody>
+              <a:bodyPr/>
+              <a:lstStyle/>
+              <a:p>
+                <a:r>
+                  <a:rPr lang="en-US">
+                    <a:noFill/>
+                  </a:rPr>
+                  <a:t> </a:t>
+                </a:r>
+              </a:p>
+            </p:txBody>
+          </p:sp>
+        </mc:Fallback>
+      </mc:AlternateContent>
+    </p:spTree>
+    <p:extLst>
+      <p:ext uri="{BB962C8B-B14F-4D97-AF65-F5344CB8AC3E}">
+        <p14:creationId xmlns:p14="http://schemas.microsoft.com/office/powerpoint/2010/main" val="2788344332"/>
+      </p:ext>
+    </p:extLst>
+  </p:cSld>
+  <p:clrMapOvr>
+    <a:masterClrMapping/>
+  </p:clrMapOvr>
+  <p:timing>
+    <p:tnLst>
+      <p:par>
+        <p:cTn id="1" dur="indefinite" restart="never" nodeType="tmRoot"/>
+      </p:par>
+    </p:tnLst>
+  </p:timing>
+</p:sld>
+</file>
+
+<file path=ppt/slides/slide2.xml><?xml version="1.0" encoding="utf-8"?>
+<p:sld xmlns:a="http://schemas.openxmlformats.org/drawingml/2006/main" xmlns:r="http://schemas.openxmlformats.org/officeDocument/2006/relationships" xmlns:p="http://schemas.openxmlformats.org/presentationml/2006/main">
+  <p:cSld>
+    <p:spTree>
+      <p:nvGrpSpPr>
+        <p:cNvPr id="1" name=""/>
+        <p:cNvGrpSpPr/>
+        <p:nvPr/>
+      </p:nvGrpSpPr>
+      <p:grpSpPr>
+        <a:xfrm>
+          <a:off x="0" y="0"/>
+          <a:ext cx="0" cy="0"/>
+          <a:chOff x="0" y="0"/>
+          <a:chExt cx="0" cy="0"/>
+        </a:xfrm>
+      </p:grpSpPr>
+      <p:sp>
+        <p:nvSpPr>
+          <p:cNvPr id="24" name="TextBox 23"/>
+          <p:cNvSpPr txBox="1"/>
+          <p:nvPr/>
+        </p:nvSpPr>
+        <p:spPr>
+          <a:xfrm>
+            <a:off x="7495861" y="2511766"/>
+            <a:ext cx="1787669" cy="1892826"/>
+          </a:xfrm>
+          <a:prstGeom prst="rect">
+            <a:avLst/>
+          </a:prstGeom>
+          <a:noFill/>
+        </p:spPr>
+        <p:txBody>
+          <a:bodyPr wrap="none" rtlCol="0">
+            <a:spAutoFit/>
+          </a:bodyPr>
+          <a:lstStyle/>
+          <a:p>
+            <a:r>
+              <a:rPr lang="nl-NL" sz="900" dirty="0" smtClean="0"/>
+              <a:t>LS </a:t>
+            </a:r>
+            <a:r>
+              <a:rPr lang="nl-NL" sz="900" dirty="0" smtClean="0"/>
+              <a:t>– Location smuggler’s go-fast</a:t>
+            </a:r>
+            <a:endParaRPr lang="nl-NL" sz="900" dirty="0" smtClean="0"/>
+          </a:p>
+          <a:p>
+            <a:r>
+              <a:rPr lang="nl-NL" sz="900" dirty="0" smtClean="0"/>
+              <a:t>AF – Amount </a:t>
+            </a:r>
+            <a:r>
+              <a:rPr lang="nl-NL" sz="900" dirty="0" smtClean="0"/>
+              <a:t>fuel </a:t>
+            </a:r>
+            <a:r>
+              <a:rPr lang="nl-NL" sz="900" dirty="0" smtClean="0"/>
+              <a:t>at time t=0</a:t>
+            </a:r>
+          </a:p>
+          <a:p>
+            <a:r>
+              <a:rPr lang="nl-NL" sz="900" dirty="0" smtClean="0"/>
+              <a:t>LR – Location </a:t>
+            </a:r>
+            <a:r>
+              <a:rPr lang="nl-NL" sz="900" dirty="0" smtClean="0"/>
+              <a:t>refueling</a:t>
+            </a:r>
+            <a:endParaRPr lang="nl-NL" sz="900" dirty="0" smtClean="0"/>
+          </a:p>
+          <a:p>
+            <a:r>
+              <a:rPr lang="nl-NL" sz="900" dirty="0" smtClean="0"/>
+              <a:t>IA – Intercept </a:t>
+            </a:r>
+            <a:r>
+              <a:rPr lang="nl-NL" sz="900" dirty="0" smtClean="0"/>
+              <a:t>area</a:t>
+            </a:r>
+            <a:endParaRPr lang="nl-NL" sz="900" dirty="0" smtClean="0"/>
+          </a:p>
+          <a:p>
+            <a:r>
+              <a:rPr lang="nl-NL" sz="900" dirty="0" smtClean="0"/>
+              <a:t>LP – Location </a:t>
+            </a:r>
+            <a:r>
+              <a:rPr lang="nl-NL" sz="900" dirty="0" smtClean="0"/>
+              <a:t>intercept vehicle</a:t>
+            </a:r>
+            <a:endParaRPr lang="nl-NL" sz="900" dirty="0" smtClean="0"/>
+          </a:p>
+          <a:p>
+            <a:r>
+              <a:rPr lang="nl-NL" sz="900" dirty="0" smtClean="0"/>
+              <a:t>RA – Refueling </a:t>
+            </a:r>
+            <a:r>
+              <a:rPr lang="nl-NL" sz="900" dirty="0" smtClean="0"/>
+              <a:t>action</a:t>
+            </a:r>
+            <a:endParaRPr lang="nl-NL" sz="900" dirty="0" smtClean="0"/>
+          </a:p>
+          <a:p>
+            <a:r>
+              <a:rPr lang="nl-NL" sz="900" dirty="0" smtClean="0"/>
+              <a:t>D </a:t>
+            </a:r>
+            <a:r>
+              <a:rPr lang="nl-NL" sz="900" dirty="0" smtClean="0"/>
+              <a:t>– </a:t>
+            </a:r>
+            <a:r>
+              <a:rPr lang="nl-NL" sz="900" dirty="0" smtClean="0"/>
+              <a:t>Destination smuggler’s go-fast</a:t>
+            </a:r>
+          </a:p>
+          <a:p>
+            <a:r>
+              <a:rPr lang="nl-NL" sz="900" dirty="0" smtClean="0"/>
+              <a:t>VO – </a:t>
+            </a:r>
+            <a:r>
+              <a:rPr lang="en-US" sz="900" dirty="0" smtClean="0"/>
+              <a:t>Visual observation go-fast</a:t>
+            </a:r>
+            <a:endParaRPr lang="en-US" sz="900" dirty="0"/>
+          </a:p>
+          <a:p>
+            <a:r>
+              <a:rPr lang="en-US" sz="900" dirty="0" smtClean="0"/>
+              <a:t>RO </a:t>
+            </a:r>
+            <a:r>
+              <a:rPr lang="en-US" sz="900" dirty="0" smtClean="0"/>
+              <a:t>– Radar observation go-fast</a:t>
+            </a:r>
+          </a:p>
+          <a:p>
+            <a:r>
+              <a:rPr lang="en-US" sz="900" dirty="0" smtClean="0"/>
+              <a:t>SO – Sonar observation go-fast</a:t>
+            </a:r>
+            <a:endParaRPr lang="en-US" sz="900" dirty="0" smtClean="0"/>
+          </a:p>
+          <a:p>
+            <a:r>
+              <a:rPr lang="en-US" sz="900" dirty="0" smtClean="0"/>
+              <a:t>B – Bearing </a:t>
+            </a:r>
+            <a:r>
+              <a:rPr lang="en-US" sz="900" dirty="0" smtClean="0"/>
+              <a:t>intercept vehicle</a:t>
+            </a:r>
+          </a:p>
+          <a:p>
+            <a:r>
+              <a:rPr lang="en-US" sz="900" dirty="0" smtClean="0"/>
+              <a:t>U – Utility</a:t>
+            </a:r>
+            <a:endParaRPr lang="en-US" sz="900" dirty="0"/>
+          </a:p>
+          <a:p>
+            <a:endParaRPr lang="en-US" sz="900" dirty="0"/>
+          </a:p>
+        </p:txBody>
+      </p:sp>
+      <p:sp>
+        <p:nvSpPr>
+          <p:cNvPr id="64" name="Oval 63"/>
+          <p:cNvSpPr/>
+          <p:nvPr/>
+        </p:nvSpPr>
+        <p:spPr>
+          <a:xfrm>
+            <a:off x="7426291" y="381374"/>
+            <a:ext cx="658291" cy="465221"/>
+          </a:xfrm>
+          <a:prstGeom prst="ellipse">
+            <a:avLst/>
+          </a:prstGeom>
+        </p:spPr>
+        <p:style>
+          <a:lnRef idx="2">
+            <a:schemeClr val="dk1"/>
+          </a:lnRef>
+          <a:fillRef idx="1">
+            <a:schemeClr val="lt1"/>
+          </a:fillRef>
+          <a:effectRef idx="0">
+            <a:schemeClr val="dk1"/>
+          </a:effectRef>
+          <a:fontRef idx="minor">
+            <a:schemeClr val="dk1"/>
+          </a:fontRef>
+        </p:style>
+        <p:txBody>
+          <a:bodyPr rtlCol="0" anchor="ctr"/>
+          <a:lstStyle/>
+          <a:p>
+            <a:pPr algn="ctr"/>
+            <a:r>
+              <a:rPr lang="en-US" sz="1000" dirty="0" smtClean="0">
+                <a:solidFill>
+                  <a:schemeClr val="tx1"/>
+                </a:solidFill>
+              </a:rPr>
+              <a:t>AF</a:t>
+            </a:r>
+            <a:endParaRPr lang="en-US" sz="1000" dirty="0">
+              <a:solidFill>
+                <a:schemeClr val="tx1"/>
+              </a:solidFill>
+            </a:endParaRPr>
+          </a:p>
+        </p:txBody>
+      </p:sp>
+      <p:sp>
+        <p:nvSpPr>
+          <p:cNvPr id="65" name="Oval 64"/>
+          <p:cNvSpPr/>
+          <p:nvPr/>
+        </p:nvSpPr>
+        <p:spPr>
+          <a:xfrm>
+            <a:off x="6570900" y="381374"/>
+            <a:ext cx="662585" cy="465221"/>
+          </a:xfrm>
+          <a:prstGeom prst="ellipse">
+            <a:avLst/>
+          </a:prstGeom>
+        </p:spPr>
+        <p:style>
+          <a:lnRef idx="2">
+            <a:schemeClr val="dk1"/>
+          </a:lnRef>
+          <a:fillRef idx="1">
+            <a:schemeClr val="lt1"/>
+          </a:fillRef>
+          <a:effectRef idx="0">
+            <a:schemeClr val="dk1"/>
+          </a:effectRef>
+          <a:fontRef idx="minor">
+            <a:schemeClr val="dk1"/>
+          </a:fontRef>
+        </p:style>
+        <p:txBody>
+          <a:bodyPr rtlCol="0" anchor="ctr"/>
+          <a:lstStyle/>
+          <a:p>
+            <a:pPr algn="ctr"/>
+            <a:r>
+              <a:rPr lang="en-US" sz="1000" dirty="0" smtClean="0">
+                <a:solidFill>
+                  <a:schemeClr val="tx1"/>
+                </a:solidFill>
+              </a:rPr>
+              <a:t>LR</a:t>
+            </a:r>
+            <a:endParaRPr lang="en-US" sz="1000" dirty="0">
+              <a:solidFill>
+                <a:schemeClr val="tx1"/>
+              </a:solidFill>
+            </a:endParaRPr>
+          </a:p>
+        </p:txBody>
+      </p:sp>
+      <p:sp>
+        <p:nvSpPr>
+          <p:cNvPr id="66" name="Oval 65"/>
+          <p:cNvSpPr/>
+          <p:nvPr/>
+        </p:nvSpPr>
+        <p:spPr>
+          <a:xfrm>
+            <a:off x="6668852" y="1570401"/>
+            <a:ext cx="618608" cy="465221"/>
+          </a:xfrm>
+          <a:prstGeom prst="ellipse">
+            <a:avLst/>
+          </a:prstGeom>
+        </p:spPr>
+        <p:style>
+          <a:lnRef idx="2">
+            <a:schemeClr val="dk1"/>
+          </a:lnRef>
+          <a:fillRef idx="1">
+            <a:schemeClr val="lt1"/>
+          </a:fillRef>
+          <a:effectRef idx="0">
+            <a:schemeClr val="dk1"/>
+          </a:effectRef>
+          <a:fontRef idx="minor">
+            <a:schemeClr val="dk1"/>
+          </a:fontRef>
+        </p:style>
+        <p:txBody>
+          <a:bodyPr rtlCol="0" anchor="ctr"/>
+          <a:lstStyle/>
+          <a:p>
+            <a:pPr algn="ctr"/>
+            <a:r>
+              <a:rPr lang="en-US" sz="1000" dirty="0" smtClean="0">
+                <a:solidFill>
+                  <a:schemeClr val="tx1"/>
+                </a:solidFill>
+              </a:rPr>
+              <a:t>RA</a:t>
+            </a:r>
+            <a:endParaRPr lang="en-US" sz="1000" dirty="0">
+              <a:solidFill>
+                <a:schemeClr val="tx1"/>
+              </a:solidFill>
+            </a:endParaRPr>
+          </a:p>
+        </p:txBody>
+      </p:sp>
+      <p:sp>
+        <p:nvSpPr>
+          <p:cNvPr id="67" name="Oval 66"/>
+          <p:cNvSpPr/>
+          <p:nvPr/>
+        </p:nvSpPr>
+        <p:spPr>
+          <a:xfrm>
+            <a:off x="5564172" y="381373"/>
+            <a:ext cx="608304" cy="465221"/>
+          </a:xfrm>
+          <a:prstGeom prst="ellipse">
+            <a:avLst/>
+          </a:prstGeom>
+        </p:spPr>
+        <p:style>
+          <a:lnRef idx="2">
+            <a:schemeClr val="dk1"/>
+          </a:lnRef>
+          <a:fillRef idx="1">
+            <a:schemeClr val="lt1"/>
+          </a:fillRef>
+          <a:effectRef idx="0">
+            <a:schemeClr val="dk1"/>
+          </a:effectRef>
+          <a:fontRef idx="minor">
+            <a:schemeClr val="dk1"/>
+          </a:fontRef>
+        </p:style>
+        <p:txBody>
+          <a:bodyPr rtlCol="0" anchor="ctr"/>
+          <a:lstStyle/>
+          <a:p>
+            <a:pPr algn="ctr"/>
+            <a:r>
+              <a:rPr lang="en-US" sz="1000" dirty="0" smtClean="0">
+                <a:solidFill>
+                  <a:schemeClr val="tx1"/>
+                </a:solidFill>
+              </a:rPr>
+              <a:t>D</a:t>
+            </a:r>
+            <a:endParaRPr lang="en-US" sz="1000" dirty="0">
+              <a:solidFill>
+                <a:schemeClr val="tx1"/>
+              </a:solidFill>
+            </a:endParaRPr>
+          </a:p>
+        </p:txBody>
+      </p:sp>
+      <p:sp>
+        <p:nvSpPr>
+          <p:cNvPr id="68" name="Oval 67"/>
+          <p:cNvSpPr/>
+          <p:nvPr/>
+        </p:nvSpPr>
+        <p:spPr>
+          <a:xfrm>
+            <a:off x="4119132" y="1555923"/>
+            <a:ext cx="570722" cy="465221"/>
+          </a:xfrm>
+          <a:prstGeom prst="ellipse">
+            <a:avLst/>
+          </a:prstGeom>
+        </p:spPr>
+        <p:style>
+          <a:lnRef idx="2">
+            <a:schemeClr val="dk1"/>
+          </a:lnRef>
+          <a:fillRef idx="1">
+            <a:schemeClr val="lt1"/>
+          </a:fillRef>
+          <a:effectRef idx="0">
+            <a:schemeClr val="dk1"/>
+          </a:effectRef>
+          <a:fontRef idx="minor">
+            <a:schemeClr val="dk1"/>
+          </a:fontRef>
+        </p:style>
+        <p:txBody>
+          <a:bodyPr rtlCol="0" anchor="ctr"/>
+          <a:lstStyle/>
+          <a:p>
+            <a:pPr algn="ctr"/>
+            <a:r>
+              <a:rPr lang="en-US" sz="1000" dirty="0" smtClean="0">
+                <a:solidFill>
+                  <a:schemeClr val="tx1"/>
+                </a:solidFill>
+              </a:rPr>
+              <a:t>LS</a:t>
+            </a:r>
+            <a:endParaRPr lang="en-US" sz="1000" dirty="0">
+              <a:solidFill>
+                <a:schemeClr val="tx1"/>
+              </a:solidFill>
+            </a:endParaRPr>
+          </a:p>
+        </p:txBody>
+      </p:sp>
+      <p:cxnSp>
+        <p:nvCxnSpPr>
+          <p:cNvPr id="69" name="Straight Arrow Connector 68"/>
+          <p:cNvCxnSpPr>
+            <a:stCxn id="68" idx="4"/>
+            <a:endCxn id="25" idx="1"/>
+          </p:cNvCxnSpPr>
+          <p:nvPr/>
+        </p:nvCxnSpPr>
+        <p:spPr>
+          <a:xfrm>
+            <a:off x="4404493" y="2021144"/>
+            <a:ext cx="1450638" cy="876562"/>
+          </a:xfrm>
+          <a:prstGeom prst="straightConnector1">
+            <a:avLst/>
+          </a:prstGeom>
+          <a:ln>
+            <a:headEnd type="none"/>
+            <a:tailEnd type="triangle" w="lg" len="med"/>
+          </a:ln>
+        </p:spPr>
+        <p:style>
+          <a:lnRef idx="2">
+            <a:schemeClr val="dk1"/>
+          </a:lnRef>
+          <a:fillRef idx="1">
+            <a:schemeClr val="lt1"/>
+          </a:fillRef>
+          <a:effectRef idx="0">
+            <a:schemeClr val="dk1"/>
+          </a:effectRef>
+          <a:fontRef idx="minor">
+            <a:schemeClr val="dk1"/>
+          </a:fontRef>
+        </p:style>
+      </p:cxnSp>
       <mc:AlternateContent xmlns:mc="http://schemas.openxmlformats.org/markup-compatibility/2006">
         <mc:Choice xmlns:a14="http://schemas.microsoft.com/office/drawing/2010/main" Requires="a14">
           <p:sp>
@@ -3387,7 +5292,7 @@
             </p:nvSpPr>
             <p:spPr>
               <a:xfrm>
-                <a:off x="5436241" y="1570401"/>
+                <a:off x="5107440" y="1570401"/>
                 <a:ext cx="630595" cy="465221"/>
               </a:xfrm>
               <a:prstGeom prst="ellipse">
@@ -3451,7 +5356,7 @@
             </p:nvSpPr>
             <p:spPr>
               <a:xfrm>
-                <a:off x="5436241" y="1570401"/>
+                <a:off x="5107440" y="1570401"/>
                 <a:ext cx="630595" cy="465221"/>
               </a:xfrm>
               <a:prstGeom prst="ellipse">
@@ -3703,35 +5608,29 @@
         </p:nvCxnSpPr>
         <p:spPr>
           <a:xfrm flipH="1">
-            <a:off x="3079954" y="2050568"/>
-            <a:ext cx="718385" cy="704306"/>
+            <a:off x="3079954" y="2021144"/>
+            <a:ext cx="1324539" cy="733730"/>
           </a:xfrm>
           <a:prstGeom prst="straightConnector1">
             <a:avLst/>
           </a:prstGeom>
-          <a:ln w="38100">
-            <a:solidFill>
-              <a:schemeClr val="tx1">
-                <a:lumMod val="50000"/>
-                <a:lumOff val="50000"/>
-              </a:schemeClr>
-            </a:solidFill>
+          <a:ln>
             <a:headEnd type="none"/>
             <a:tailEnd type="triangle" w="lg" len="med"/>
           </a:ln>
         </p:spPr>
         <p:style>
-          <a:lnRef idx="1">
-            <a:schemeClr val="accent1"/>
+          <a:lnRef idx="2">
+            <a:schemeClr val="dk1"/>
           </a:lnRef>
-          <a:fillRef idx="0">
-            <a:schemeClr val="accent1"/>
+          <a:fillRef idx="1">
+            <a:schemeClr val="lt1"/>
           </a:fillRef>
           <a:effectRef idx="0">
-            <a:schemeClr val="accent1"/>
+            <a:schemeClr val="dk1"/>
           </a:effectRef>
           <a:fontRef idx="minor">
-            <a:schemeClr val="tx1"/>
+            <a:schemeClr val="dk1"/>
           </a:fontRef>
         </p:style>
       </p:cxnSp>
@@ -3856,36 +5755,30 @@
           <p:nvPr/>
         </p:nvCxnSpPr>
         <p:spPr>
-          <a:xfrm>
-            <a:off x="3798339" y="2050568"/>
-            <a:ext cx="33493" cy="704307"/>
+          <a:xfrm flipH="1">
+            <a:off x="3831832" y="2021144"/>
+            <a:ext cx="572661" cy="733731"/>
           </a:xfrm>
           <a:prstGeom prst="straightConnector1">
             <a:avLst/>
           </a:prstGeom>
-          <a:ln w="38100">
-            <a:solidFill>
-              <a:schemeClr val="tx1">
-                <a:lumMod val="50000"/>
-                <a:lumOff val="50000"/>
-              </a:schemeClr>
-            </a:solidFill>
+          <a:ln>
             <a:headEnd type="none"/>
             <a:tailEnd type="triangle" w="lg" len="med"/>
           </a:ln>
         </p:spPr>
         <p:style>
-          <a:lnRef idx="1">
-            <a:schemeClr val="accent1"/>
+          <a:lnRef idx="2">
+            <a:schemeClr val="dk1"/>
           </a:lnRef>
-          <a:fillRef idx="0">
-            <a:schemeClr val="accent1"/>
+          <a:fillRef idx="1">
+            <a:schemeClr val="lt1"/>
           </a:fillRef>
           <a:effectRef idx="0">
-            <a:schemeClr val="accent1"/>
+            <a:schemeClr val="dk1"/>
           </a:effectRef>
           <a:fontRef idx="minor">
-            <a:schemeClr val="tx1"/>
+            <a:schemeClr val="dk1"/>
           </a:fontRef>
         </p:style>
       </p:cxnSp>
@@ -3900,35 +5793,29 @@
         </p:nvCxnSpPr>
         <p:spPr>
           <a:xfrm>
-            <a:off x="3798339" y="2050568"/>
-            <a:ext cx="1732147" cy="1829531"/>
+            <a:off x="4404493" y="2021144"/>
+            <a:ext cx="1125993" cy="1858955"/>
           </a:xfrm>
           <a:prstGeom prst="straightConnector1">
             <a:avLst/>
           </a:prstGeom>
-          <a:ln w="38100">
-            <a:solidFill>
-              <a:schemeClr val="tx1">
-                <a:lumMod val="50000"/>
-                <a:lumOff val="50000"/>
-              </a:schemeClr>
-            </a:solidFill>
+          <a:ln>
             <a:headEnd type="none"/>
             <a:tailEnd type="triangle" w="lg" len="med"/>
           </a:ln>
         </p:spPr>
         <p:style>
-          <a:lnRef idx="1">
-            <a:schemeClr val="accent1"/>
+          <a:lnRef idx="2">
+            <a:schemeClr val="dk1"/>
           </a:lnRef>
-          <a:fillRef idx="0">
-            <a:schemeClr val="accent1"/>
+          <a:fillRef idx="1">
+            <a:schemeClr val="lt1"/>
           </a:fillRef>
           <a:effectRef idx="0">
-            <a:schemeClr val="accent1"/>
+            <a:schemeClr val="dk1"/>
           </a:effectRef>
           <a:fontRef idx="minor">
-            <a:schemeClr val="tx1"/>
+            <a:schemeClr val="dk1"/>
           </a:fontRef>
         </p:style>
       </p:cxnSp>
@@ -3949,29 +5836,23 @@
           <a:prstGeom prst="straightConnector1">
             <a:avLst/>
           </a:prstGeom>
-          <a:ln w="38100">
-            <a:solidFill>
-              <a:schemeClr val="tx1">
-                <a:lumMod val="50000"/>
-                <a:lumOff val="50000"/>
-              </a:schemeClr>
-            </a:solidFill>
+          <a:ln>
             <a:headEnd type="none"/>
             <a:tailEnd type="triangle" w="lg" len="med"/>
           </a:ln>
         </p:spPr>
         <p:style>
-          <a:lnRef idx="1">
-            <a:schemeClr val="accent1"/>
+          <a:lnRef idx="2">
+            <a:schemeClr val="dk1"/>
           </a:lnRef>
-          <a:fillRef idx="0">
-            <a:schemeClr val="accent1"/>
+          <a:fillRef idx="1">
+            <a:schemeClr val="lt1"/>
           </a:fillRef>
           <a:effectRef idx="0">
-            <a:schemeClr val="accent1"/>
+            <a:schemeClr val="dk1"/>
           </a:effectRef>
           <a:fontRef idx="minor">
-            <a:schemeClr val="tx1"/>
+            <a:schemeClr val="dk1"/>
           </a:fontRef>
         </p:style>
       </p:cxnSp>
@@ -3992,29 +5873,23 @@
           <a:prstGeom prst="straightConnector1">
             <a:avLst/>
           </a:prstGeom>
-          <a:ln w="38100">
-            <a:solidFill>
-              <a:schemeClr val="tx1">
-                <a:lumMod val="50000"/>
-                <a:lumOff val="50000"/>
-              </a:schemeClr>
-            </a:solidFill>
+          <a:ln>
             <a:headEnd type="none"/>
             <a:tailEnd type="triangle" w="lg" len="med"/>
           </a:ln>
         </p:spPr>
         <p:style>
-          <a:lnRef idx="1">
-            <a:schemeClr val="accent1"/>
+          <a:lnRef idx="2">
+            <a:schemeClr val="dk1"/>
           </a:lnRef>
-          <a:fillRef idx="0">
-            <a:schemeClr val="accent1"/>
+          <a:fillRef idx="1">
+            <a:schemeClr val="lt1"/>
           </a:fillRef>
           <a:effectRef idx="0">
-            <a:schemeClr val="accent1"/>
+            <a:schemeClr val="dk1"/>
           </a:effectRef>
           <a:fontRef idx="minor">
-            <a:schemeClr val="tx1"/>
+            <a:schemeClr val="dk1"/>
           </a:fontRef>
         </p:style>
       </p:cxnSp>
@@ -4035,29 +5910,23 @@
           <a:prstGeom prst="straightConnector1">
             <a:avLst/>
           </a:prstGeom>
-          <a:ln w="38100">
-            <a:solidFill>
-              <a:schemeClr val="tx1">
-                <a:lumMod val="50000"/>
-                <a:lumOff val="50000"/>
-              </a:schemeClr>
-            </a:solidFill>
+          <a:ln>
             <a:headEnd type="none"/>
             <a:tailEnd type="triangle" w="lg" len="med"/>
           </a:ln>
         </p:spPr>
         <p:style>
-          <a:lnRef idx="1">
-            <a:schemeClr val="accent1"/>
+          <a:lnRef idx="2">
+            <a:schemeClr val="dk1"/>
           </a:lnRef>
-          <a:fillRef idx="0">
-            <a:schemeClr val="accent1"/>
+          <a:fillRef idx="1">
+            <a:schemeClr val="lt1"/>
           </a:fillRef>
           <a:effectRef idx="0">
-            <a:schemeClr val="accent1"/>
+            <a:schemeClr val="dk1"/>
           </a:effectRef>
           <a:fontRef idx="minor">
-            <a:schemeClr val="tx1"/>
+            <a:schemeClr val="dk1"/>
           </a:fontRef>
         </p:style>
       </p:cxnSp>
@@ -4078,29 +5947,23 @@
           <a:prstGeom prst="straightConnector1">
             <a:avLst/>
           </a:prstGeom>
-          <a:ln w="38100">
-            <a:solidFill>
-              <a:schemeClr val="tx1">
-                <a:lumMod val="50000"/>
-                <a:lumOff val="50000"/>
-              </a:schemeClr>
-            </a:solidFill>
+          <a:ln>
             <a:headEnd type="none"/>
             <a:tailEnd type="triangle" w="lg" len="med"/>
           </a:ln>
         </p:spPr>
         <p:style>
-          <a:lnRef idx="1">
-            <a:schemeClr val="accent1"/>
+          <a:lnRef idx="2">
+            <a:schemeClr val="dk1"/>
           </a:lnRef>
-          <a:fillRef idx="0">
-            <a:schemeClr val="accent1"/>
+          <a:fillRef idx="1">
+            <a:schemeClr val="lt1"/>
           </a:fillRef>
           <a:effectRef idx="0">
-            <a:schemeClr val="accent1"/>
+            <a:schemeClr val="dk1"/>
           </a:effectRef>
           <a:fontRef idx="minor">
-            <a:schemeClr val="tx1"/>
+            <a:schemeClr val="dk1"/>
           </a:fontRef>
         </p:style>
       </p:cxnSp>
@@ -4115,35 +5978,29 @@
         </p:nvCxnSpPr>
         <p:spPr>
           <a:xfrm>
-            <a:off x="5751539" y="2035622"/>
-            <a:ext cx="337852" cy="793954"/>
+            <a:off x="5422738" y="2035622"/>
+            <a:ext cx="666653" cy="793954"/>
           </a:xfrm>
           <a:prstGeom prst="straightConnector1">
             <a:avLst/>
           </a:prstGeom>
-          <a:ln w="38100">
-            <a:solidFill>
-              <a:schemeClr val="tx1">
-                <a:lumMod val="50000"/>
-                <a:lumOff val="50000"/>
-              </a:schemeClr>
-            </a:solidFill>
+          <a:ln>
             <a:headEnd type="none"/>
             <a:tailEnd type="triangle" w="lg" len="med"/>
           </a:ln>
         </p:spPr>
         <p:style>
-          <a:lnRef idx="1">
-            <a:schemeClr val="accent1"/>
+          <a:lnRef idx="2">
+            <a:schemeClr val="dk1"/>
           </a:lnRef>
-          <a:fillRef idx="0">
-            <a:schemeClr val="accent1"/>
+          <a:fillRef idx="1">
+            <a:schemeClr val="lt1"/>
           </a:fillRef>
           <a:effectRef idx="0">
-            <a:schemeClr val="accent1"/>
+            <a:schemeClr val="dk1"/>
           </a:effectRef>
           <a:fontRef idx="minor">
-            <a:schemeClr val="tx1"/>
+            <a:schemeClr val="dk1"/>
           </a:fontRef>
         </p:style>
       </p:cxnSp>
@@ -4164,29 +6021,23 @@
           <a:prstGeom prst="straightConnector1">
             <a:avLst/>
           </a:prstGeom>
-          <a:ln w="38100">
-            <a:solidFill>
-              <a:schemeClr val="tx1">
-                <a:lumMod val="50000"/>
-                <a:lumOff val="50000"/>
-              </a:schemeClr>
-            </a:solidFill>
+          <a:ln>
             <a:headEnd type="none"/>
             <a:tailEnd type="triangle" w="lg" len="med"/>
           </a:ln>
         </p:spPr>
         <p:style>
-          <a:lnRef idx="1">
-            <a:schemeClr val="accent1"/>
+          <a:lnRef idx="2">
+            <a:schemeClr val="dk1"/>
           </a:lnRef>
-          <a:fillRef idx="0">
-            <a:schemeClr val="accent1"/>
+          <a:fillRef idx="1">
+            <a:schemeClr val="lt1"/>
           </a:fillRef>
           <a:effectRef idx="0">
-            <a:schemeClr val="accent1"/>
+            <a:schemeClr val="dk1"/>
           </a:effectRef>
           <a:fontRef idx="minor">
-            <a:schemeClr val="tx1"/>
+            <a:schemeClr val="dk1"/>
           </a:fontRef>
         </p:style>
       </p:cxnSp>
@@ -4280,7 +6131,7 @@
                   <a:schemeClr val="tx1"/>
                 </a:solidFill>
               </a:rPr>
-              <a:t>D</a:t>
+              <a:t>B</a:t>
             </a:r>
             <a:endParaRPr lang="en-US" sz="1200" dirty="0">
               <a:solidFill>
@@ -4307,29 +6158,23 @@
           <a:prstGeom prst="straightConnector1">
             <a:avLst/>
           </a:prstGeom>
-          <a:ln w="38100">
-            <a:solidFill>
-              <a:schemeClr val="tx1">
-                <a:lumMod val="50000"/>
-                <a:lumOff val="50000"/>
-              </a:schemeClr>
-            </a:solidFill>
+          <a:ln>
             <a:headEnd type="none"/>
             <a:tailEnd type="triangle" w="lg" len="med"/>
           </a:ln>
         </p:spPr>
         <p:style>
-          <a:lnRef idx="1">
-            <a:schemeClr val="accent1"/>
+          <a:lnRef idx="2">
+            <a:schemeClr val="dk1"/>
           </a:lnRef>
-          <a:fillRef idx="0">
-            <a:schemeClr val="accent1"/>
+          <a:fillRef idx="1">
+            <a:schemeClr val="lt1"/>
           </a:fillRef>
           <a:effectRef idx="0">
-            <a:schemeClr val="accent1"/>
+            <a:schemeClr val="dk1"/>
           </a:effectRef>
           <a:fontRef idx="minor">
-            <a:schemeClr val="tx1"/>
+            <a:schemeClr val="dk1"/>
           </a:fontRef>
         </p:style>
       </p:cxnSp>
@@ -4343,53 +6188,17 @@
           <p:nvPr/>
         </p:nvCxnSpPr>
         <p:spPr>
-          <a:xfrm flipH="1">
-            <a:off x="5530486" y="2035622"/>
-            <a:ext cx="221053" cy="1844477"/>
+          <a:xfrm>
+            <a:off x="5422738" y="2035622"/>
+            <a:ext cx="107748" cy="1844477"/>
           </a:xfrm>
           <a:prstGeom prst="straightConnector1">
             <a:avLst/>
           </a:prstGeom>
-          <a:ln w="38100">
-            <a:solidFill>
-              <a:schemeClr val="tx1">
-                <a:lumMod val="50000"/>
-                <a:lumOff val="50000"/>
-              </a:schemeClr>
-            </a:solidFill>
+          <a:ln>
             <a:headEnd type="none"/>
             <a:tailEnd type="triangle" w="lg" len="med"/>
           </a:ln>
-        </p:spPr>
-        <p:style>
-          <a:lnRef idx="1">
-            <a:schemeClr val="accent1"/>
-          </a:lnRef>
-          <a:fillRef idx="0">
-            <a:schemeClr val="accent1"/>
-          </a:fillRef>
-          <a:effectRef idx="0">
-            <a:schemeClr val="accent1"/>
-          </a:effectRef>
-          <a:fontRef idx="minor">
-            <a:schemeClr val="tx1"/>
-          </a:fontRef>
-        </p:style>
-      </p:cxnSp>
-      <p:sp>
-        <p:nvSpPr>
-          <p:cNvPr id="83" name="Oval 82"/>
-          <p:cNvSpPr/>
-          <p:nvPr/>
-        </p:nvSpPr>
-        <p:spPr>
-          <a:xfrm>
-            <a:off x="4486951" y="1581233"/>
-            <a:ext cx="570722" cy="465221"/>
-          </a:xfrm>
-          <a:prstGeom prst="ellipse">
-            <a:avLst/>
-          </a:prstGeom>
         </p:spPr>
         <p:style>
           <a:lnRef idx="2">
@@ -4405,67 +6214,41 @@
             <a:schemeClr val="dk1"/>
           </a:fontRef>
         </p:style>
-        <p:txBody>
-          <a:bodyPr rtlCol="0" anchor="ctr"/>
-          <a:lstStyle/>
-          <a:p>
-            <a:pPr algn="ctr"/>
-            <a:r>
-              <a:rPr lang="en-US" sz="1000" dirty="0" smtClean="0">
-                <a:solidFill>
-                  <a:schemeClr val="tx1"/>
-                </a:solidFill>
-              </a:rPr>
-              <a:t>B</a:t>
-            </a:r>
-            <a:endParaRPr lang="en-US" sz="1000" dirty="0">
-              <a:solidFill>
-                <a:schemeClr val="tx1"/>
-              </a:solidFill>
-            </a:endParaRPr>
-          </a:p>
-        </p:txBody>
-      </p:sp>
+      </p:cxnSp>
       <p:cxnSp>
         <p:nvCxnSpPr>
-          <p:cNvPr id="84" name="Straight Arrow Connector 83"/>
+          <p:cNvPr id="30" name="Straight Arrow Connector 29"/>
           <p:cNvCxnSpPr>
-            <a:stCxn id="83" idx="4"/>
-            <a:endCxn id="25" idx="0"/>
+            <a:stCxn id="67" idx="4"/>
+            <a:endCxn id="68" idx="0"/>
           </p:cNvCxnSpPr>
           <p:nvPr/>
         </p:nvCxnSpPr>
         <p:spPr>
-          <a:xfrm>
-            <a:off x="4772312" y="2046454"/>
-            <a:ext cx="1317079" cy="783122"/>
+          <a:xfrm flipH="1">
+            <a:off x="4404493" y="846594"/>
+            <a:ext cx="1463831" cy="709329"/>
           </a:xfrm>
           <a:prstGeom prst="straightConnector1">
             <a:avLst/>
           </a:prstGeom>
-          <a:ln w="38100">
-            <a:solidFill>
-              <a:schemeClr val="tx1">
-                <a:lumMod val="50000"/>
-                <a:lumOff val="50000"/>
-              </a:schemeClr>
-            </a:solidFill>
+          <a:ln>
             <a:headEnd type="none"/>
             <a:tailEnd type="triangle" w="lg" len="med"/>
           </a:ln>
         </p:spPr>
         <p:style>
-          <a:lnRef idx="1">
-            <a:schemeClr val="accent1"/>
+          <a:lnRef idx="2">
+            <a:schemeClr val="dk1"/>
           </a:lnRef>
-          <a:fillRef idx="0">
-            <a:schemeClr val="accent1"/>
+          <a:fillRef idx="1">
+            <a:schemeClr val="lt1"/>
           </a:fillRef>
           <a:effectRef idx="0">
-            <a:schemeClr val="accent1"/>
+            <a:schemeClr val="dk1"/>
           </a:effectRef>
           <a:fontRef idx="minor">
-            <a:schemeClr val="tx1"/>
+            <a:schemeClr val="dk1"/>
           </a:fontRef>
         </p:style>
       </p:cxnSp>
@@ -4473,26 +6256,38 @@
         <mc:Choice xmlns:a14="http://schemas.microsoft.com/office/drawing/2010/main" Requires="a14">
           <p:sp>
             <p:nvSpPr>
-              <p:cNvPr id="74" name="TextBox 73"/>
-              <p:cNvSpPr txBox="1"/>
+              <p:cNvPr id="40" name="Oval 39"/>
+              <p:cNvSpPr/>
               <p:nvPr/>
             </p:nvSpPr>
             <p:spPr>
               <a:xfrm>
-                <a:off x="2950648" y="4882341"/>
-                <a:ext cx="4834336" cy="276999"/>
+                <a:off x="4255890" y="2761150"/>
+                <a:ext cx="574600" cy="465221"/>
               </a:xfrm>
-              <a:prstGeom prst="rect">
+              <a:prstGeom prst="ellipse">
                 <a:avLst/>
               </a:prstGeom>
-              <a:noFill/>
             </p:spPr>
+            <p:style>
+              <a:lnRef idx="2">
+                <a:schemeClr val="dk1"/>
+              </a:lnRef>
+              <a:fillRef idx="1">
+                <a:schemeClr val="lt1"/>
+              </a:fillRef>
+              <a:effectRef idx="0">
+                <a:schemeClr val="dk1"/>
+              </a:effectRef>
+              <a:fontRef idx="minor">
+                <a:schemeClr val="dk1"/>
+              </a:fontRef>
+            </p:style>
             <p:txBody>
-              <a:bodyPr wrap="none" lIns="0" tIns="0" rIns="0" bIns="0" rtlCol="0">
-                <a:spAutoFit/>
-              </a:bodyPr>
+              <a:bodyPr rtlCol="0" anchor="ctr"/>
               <a:lstStyle/>
               <a:p>
+                <a:pPr algn="ctr"/>
                 <a14:m>
                   <m:oMathPara xmlns:m="http://schemas.openxmlformats.org/officeDocument/2006/math">
                     <m:oMathParaPr>
@@ -4500,168 +6295,31 @@
                     </m:oMathParaPr>
                     <m:oMath xmlns:m="http://schemas.openxmlformats.org/officeDocument/2006/math">
                       <m:r>
-                        <a:rPr lang="en-US" b="0" i="1" smtClean="0">
+                        <a:rPr lang="en-US" sz="1000" b="0" i="1" smtClean="0">
+                          <a:solidFill>
+                            <a:schemeClr val="tx1"/>
+                          </a:solidFill>
                           <a:latin typeface="Cambria Math" panose="02040503050406030204" pitchFamily="18" charset="0"/>
                         </a:rPr>
-                        <m:t>𝑈</m:t>
+                        <m:t>𝑆</m:t>
                       </m:r>
-                      <m:d>
-                        <m:dPr>
-                          <m:ctrlPr>
-                            <a:rPr lang="en-US" b="0" i="1" smtClean="0">
-                              <a:latin typeface="Cambria Math" panose="02040503050406030204" pitchFamily="18" charset="0"/>
-                            </a:rPr>
-                          </m:ctrlPr>
-                        </m:dPr>
-                        <m:e>
-                          <m:r>
-                            <a:rPr lang="en-US" b="0" i="1" smtClean="0">
-                              <a:latin typeface="Cambria Math" panose="02040503050406030204" pitchFamily="18" charset="0"/>
-                            </a:rPr>
-                            <m:t>𝐿𝑆</m:t>
-                          </m:r>
-                          <m:r>
-                            <a:rPr lang="en-US" b="0" i="1" smtClean="0">
-                              <a:latin typeface="Cambria Math" panose="02040503050406030204" pitchFamily="18" charset="0"/>
-                            </a:rPr>
-                            <m:t>,</m:t>
-                          </m:r>
-                          <m:r>
-                            <a:rPr lang="en-US" b="0" i="1" smtClean="0">
-                              <a:latin typeface="Cambria Math" panose="02040503050406030204" pitchFamily="18" charset="0"/>
-                            </a:rPr>
-                            <m:t>𝐿𝑃</m:t>
-                          </m:r>
-                          <m:r>
-                            <a:rPr lang="en-US" b="0" i="1" smtClean="0">
-                              <a:latin typeface="Cambria Math" panose="02040503050406030204" pitchFamily="18" charset="0"/>
-                            </a:rPr>
-                            <m:t>,</m:t>
-                          </m:r>
-                          <m:r>
-                            <a:rPr lang="en-US" b="0" i="1" smtClean="0">
-                              <a:latin typeface="Cambria Math" panose="02040503050406030204" pitchFamily="18" charset="0"/>
-                            </a:rPr>
-                            <m:t>𝐼𝐴</m:t>
-                          </m:r>
-                        </m:e>
-                      </m:d>
                       <m:r>
-                        <a:rPr lang="en-US" b="0" i="1" smtClean="0">
+                        <a:rPr lang="en-US" sz="1000" b="0" i="1" smtClean="0">
+                          <a:solidFill>
+                            <a:schemeClr val="tx1"/>
+                          </a:solidFill>
                           <a:latin typeface="Cambria Math" panose="02040503050406030204" pitchFamily="18" charset="0"/>
                         </a:rPr>
-                        <m:t>=−</m:t>
-                      </m:r>
-                      <m:d>
-                        <m:dPr>
-                          <m:ctrlPr>
-                            <a:rPr lang="en-US" b="0" i="1" smtClean="0">
-                              <a:latin typeface="Cambria Math" panose="02040503050406030204" pitchFamily="18" charset="0"/>
-                            </a:rPr>
-                          </m:ctrlPr>
-                        </m:dPr>
-                        <m:e>
-                          <m:r>
-                            <a:rPr lang="en-US" b="0" i="1" smtClean="0">
-                              <a:latin typeface="Cambria Math" panose="02040503050406030204" pitchFamily="18" charset="0"/>
-                            </a:rPr>
-                            <m:t>1−</m:t>
-                          </m:r>
-                          <m:r>
-                            <a:rPr lang="en-US" b="0" i="1" smtClean="0">
-                              <a:latin typeface="Cambria Math" panose="02040503050406030204" pitchFamily="18" charset="0"/>
-                            </a:rPr>
-                            <m:t>𝛼</m:t>
-                          </m:r>
-                        </m:e>
-                      </m:d>
-                      <m:r>
-                        <a:rPr lang="en-US" b="0" i="1" smtClean="0">
-                          <a:latin typeface="Cambria Math" panose="02040503050406030204" pitchFamily="18" charset="0"/>
-                        </a:rPr>
-                        <m:t>𝑑</m:t>
-                      </m:r>
-                      <m:d>
-                        <m:dPr>
-                          <m:ctrlPr>
-                            <a:rPr lang="en-US" b="0" i="1" smtClean="0">
-                              <a:latin typeface="Cambria Math" panose="02040503050406030204" pitchFamily="18" charset="0"/>
-                            </a:rPr>
-                          </m:ctrlPr>
-                        </m:dPr>
-                        <m:e>
-                          <m:r>
-                            <a:rPr lang="en-US" b="0" i="1" smtClean="0">
-                              <a:latin typeface="Cambria Math" panose="02040503050406030204" pitchFamily="18" charset="0"/>
-                            </a:rPr>
-                            <m:t>𝐿𝑆</m:t>
-                          </m:r>
-                          <m:r>
-                            <a:rPr lang="en-US" b="0" i="1" smtClean="0">
-                              <a:latin typeface="Cambria Math" panose="02040503050406030204" pitchFamily="18" charset="0"/>
-                            </a:rPr>
-                            <m:t>,</m:t>
-                          </m:r>
-                          <m:r>
-                            <a:rPr lang="en-US" b="0" i="1" smtClean="0">
-                              <a:latin typeface="Cambria Math" panose="02040503050406030204" pitchFamily="18" charset="0"/>
-                            </a:rPr>
-                            <m:t>𝐿𝑃</m:t>
-                          </m:r>
-                        </m:e>
-                      </m:d>
-                      <m:r>
-                        <a:rPr lang="en-US" b="0" i="1" smtClean="0">
-                          <a:latin typeface="Cambria Math" panose="02040503050406030204" pitchFamily="18" charset="0"/>
-                        </a:rPr>
-                        <m:t>−</m:t>
-                      </m:r>
-                      <m:r>
-                        <a:rPr lang="en-US" b="0" i="1" smtClean="0">
-                          <a:latin typeface="Cambria Math" panose="02040503050406030204" pitchFamily="18" charset="0"/>
-                        </a:rPr>
-                        <m:t>𝛼</m:t>
-                      </m:r>
-                      <m:r>
-                        <a:rPr lang="en-US" b="0" i="1" smtClean="0">
-                          <a:latin typeface="Cambria Math" panose="02040503050406030204" pitchFamily="18" charset="0"/>
-                        </a:rPr>
-                        <m:t>𝑑</m:t>
-                      </m:r>
-                      <m:r>
-                        <a:rPr lang="en-US" b="0" i="1" smtClean="0">
-                          <a:latin typeface="Cambria Math" panose="02040503050406030204" pitchFamily="18" charset="0"/>
-                        </a:rPr>
-                        <m:t>(</m:t>
-                      </m:r>
-                      <m:r>
-                        <a:rPr lang="en-US" b="0" i="1" smtClean="0">
-                          <a:latin typeface="Cambria Math" panose="02040503050406030204" pitchFamily="18" charset="0"/>
-                        </a:rPr>
-                        <m:t>𝐼𝐴</m:t>
-                      </m:r>
-                      <m:r>
-                        <a:rPr lang="en-US" b="0" i="1" smtClean="0">
-                          <a:latin typeface="Cambria Math" panose="02040503050406030204" pitchFamily="18" charset="0"/>
-                        </a:rPr>
-                        <m:t>,</m:t>
-                      </m:r>
-                      <m:r>
-                        <a:rPr lang="en-US" b="0" i="1" smtClean="0">
-                          <a:latin typeface="Cambria Math" panose="02040503050406030204" pitchFamily="18" charset="0"/>
-                        </a:rPr>
-                        <m:t>𝐿𝑃</m:t>
-                      </m:r>
-                      <m:r>
-                        <a:rPr lang="en-US" b="0" i="1" smtClean="0">
-                          <a:latin typeface="Cambria Math" panose="02040503050406030204" pitchFamily="18" charset="0"/>
-                        </a:rPr>
-                        <m:t>)</m:t>
+                        <m:t>𝑂</m:t>
                       </m:r>
                     </m:oMath>
                   </m:oMathPara>
                 </a14:m>
-                <a:endParaRPr lang="en-US" dirty="0"/>
+                <a:endParaRPr lang="en-US" sz="1000" dirty="0">
+                  <a:solidFill>
+                    <a:schemeClr val="tx1"/>
+                  </a:solidFill>
+                </a:endParaRPr>
               </a:p>
             </p:txBody>
           </p:sp>
@@ -4669,24 +6327,621 @@
         <mc:Fallback>
           <p:sp>
             <p:nvSpPr>
-              <p:cNvPr id="74" name="TextBox 73"/>
-              <p:cNvSpPr txBox="1">
+              <p:cNvPr id="40" name="Oval 39"/>
+              <p:cNvSpPr>
                 <a:spLocks noRot="1" noChangeAspect="1" noMove="1" noResize="1" noEditPoints="1" noAdjustHandles="1" noChangeArrowheads="1" noChangeShapeType="1" noTextEdit="1"/>
               </p:cNvSpPr>
               <p:nvPr/>
             </p:nvSpPr>
             <p:spPr>
               <a:xfrm>
-                <a:off x="2950648" y="4882341"/>
-                <a:ext cx="4834336" cy="276999"/>
+                <a:off x="4255890" y="2761150"/>
+                <a:ext cx="574600" cy="465221"/>
               </a:xfrm>
-              <a:prstGeom prst="rect">
+              <a:prstGeom prst="ellipse">
                 <a:avLst/>
               </a:prstGeom>
               <a:blipFill rotWithShape="0">
                 <a:blip r:embed="rId6"/>
                 <a:stretch>
-                  <a:fillRect l="-631" t="-2222" r="-1261" b="-35556"/>
+                  <a:fillRect/>
+                </a:stretch>
+              </a:blipFill>
+            </p:spPr>
+            <p:txBody>
+              <a:bodyPr/>
+              <a:lstStyle/>
+              <a:p>
+                <a:r>
+                  <a:rPr lang="en-US">
+                    <a:noFill/>
+                  </a:rPr>
+                  <a:t> </a:t>
+                </a:r>
+              </a:p>
+            </p:txBody>
+          </p:sp>
+        </mc:Fallback>
+      </mc:AlternateContent>
+      <p:cxnSp>
+        <p:nvCxnSpPr>
+          <p:cNvPr id="41" name="Straight Arrow Connector 40"/>
+          <p:cNvCxnSpPr>
+            <a:stCxn id="68" idx="4"/>
+            <a:endCxn id="40" idx="0"/>
+          </p:cNvCxnSpPr>
+          <p:nvPr/>
+        </p:nvCxnSpPr>
+        <p:spPr>
+          <a:xfrm>
+            <a:off x="4404493" y="2021144"/>
+            <a:ext cx="138697" cy="740006"/>
+          </a:xfrm>
+          <a:prstGeom prst="straightConnector1">
+            <a:avLst/>
+          </a:prstGeom>
+          <a:ln>
+            <a:headEnd type="none"/>
+            <a:tailEnd type="triangle" w="lg" len="med"/>
+          </a:ln>
+        </p:spPr>
+        <p:style>
+          <a:lnRef idx="2">
+            <a:schemeClr val="dk1"/>
+          </a:lnRef>
+          <a:fillRef idx="1">
+            <a:schemeClr val="lt1"/>
+          </a:fillRef>
+          <a:effectRef idx="0">
+            <a:schemeClr val="dk1"/>
+          </a:effectRef>
+          <a:fontRef idx="minor">
+            <a:schemeClr val="dk1"/>
+          </a:fontRef>
+        </p:style>
+      </p:cxnSp>
+    </p:spTree>
+    <p:extLst>
+      <p:ext uri="{BB962C8B-B14F-4D97-AF65-F5344CB8AC3E}">
+        <p14:creationId xmlns:p14="http://schemas.microsoft.com/office/powerpoint/2010/main" val="3180885242"/>
+      </p:ext>
+    </p:extLst>
+  </p:cSld>
+  <p:clrMapOvr>
+    <a:masterClrMapping/>
+  </p:clrMapOvr>
+  <p:timing>
+    <p:tnLst>
+      <p:par>
+        <p:cTn id="1" dur="indefinite" restart="never" nodeType="tmRoot"/>
+      </p:par>
+    </p:tnLst>
+  </p:timing>
+</p:sld>
+</file>
+
+<file path=ppt/slides/slide3.xml><?xml version="1.0" encoding="utf-8"?>
+<p:sld xmlns:a="http://schemas.openxmlformats.org/drawingml/2006/main" xmlns:r="http://schemas.openxmlformats.org/officeDocument/2006/relationships" xmlns:p="http://schemas.openxmlformats.org/presentationml/2006/main">
+  <p:cSld>
+    <p:spTree>
+      <p:nvGrpSpPr>
+        <p:cNvPr id="1" name=""/>
+        <p:cNvGrpSpPr/>
+        <p:nvPr/>
+      </p:nvGrpSpPr>
+      <p:grpSpPr>
+        <a:xfrm>
+          <a:off x="0" y="0"/>
+          <a:ext cx="0" cy="0"/>
+          <a:chOff x="0" y="0"/>
+          <a:chExt cx="0" cy="0"/>
+        </a:xfrm>
+      </p:grpSpPr>
+      <p:sp>
+        <p:nvSpPr>
+          <p:cNvPr id="24" name="TextBox 23"/>
+          <p:cNvSpPr txBox="1"/>
+          <p:nvPr/>
+        </p:nvSpPr>
+        <p:spPr>
+          <a:xfrm>
+            <a:off x="6730635" y="2556133"/>
+            <a:ext cx="1787669" cy="1477328"/>
+          </a:xfrm>
+          <a:prstGeom prst="rect">
+            <a:avLst/>
+          </a:prstGeom>
+          <a:noFill/>
+        </p:spPr>
+        <p:txBody>
+          <a:bodyPr wrap="none" rtlCol="0">
+            <a:spAutoFit/>
+          </a:bodyPr>
+          <a:lstStyle/>
+          <a:p>
+            <a:r>
+              <a:rPr lang="nl-NL" sz="900" dirty="0" smtClean="0"/>
+              <a:t>LS </a:t>
+            </a:r>
+            <a:r>
+              <a:rPr lang="nl-NL" sz="900" dirty="0" smtClean="0"/>
+              <a:t>– Location smuggler’s go-fast</a:t>
+            </a:r>
+            <a:endParaRPr lang="nl-NL" sz="900" dirty="0" smtClean="0"/>
+          </a:p>
+          <a:p>
+            <a:r>
+              <a:rPr lang="nl-NL" sz="900" dirty="0" smtClean="0"/>
+              <a:t>AF – Amount </a:t>
+            </a:r>
+            <a:r>
+              <a:rPr lang="nl-NL" sz="900" dirty="0" smtClean="0"/>
+              <a:t>fuel </a:t>
+            </a:r>
+            <a:r>
+              <a:rPr lang="nl-NL" sz="900" dirty="0" smtClean="0"/>
+              <a:t>at time t=0</a:t>
+            </a:r>
+          </a:p>
+          <a:p>
+            <a:r>
+              <a:rPr lang="nl-NL" sz="900" dirty="0" smtClean="0"/>
+              <a:t>LR – Location </a:t>
+            </a:r>
+            <a:r>
+              <a:rPr lang="nl-NL" sz="900" dirty="0" smtClean="0"/>
+              <a:t>refueling</a:t>
+            </a:r>
+            <a:endParaRPr lang="nl-NL" sz="900" dirty="0" smtClean="0"/>
+          </a:p>
+          <a:p>
+            <a:r>
+              <a:rPr lang="nl-NL" sz="900" dirty="0" smtClean="0"/>
+              <a:t>IA – Intercept </a:t>
+            </a:r>
+            <a:r>
+              <a:rPr lang="nl-NL" sz="900" dirty="0" smtClean="0"/>
+              <a:t>area</a:t>
+            </a:r>
+            <a:endParaRPr lang="nl-NL" sz="900" dirty="0" smtClean="0"/>
+          </a:p>
+          <a:p>
+            <a:r>
+              <a:rPr lang="nl-NL" sz="900" dirty="0" smtClean="0"/>
+              <a:t>LP – Location </a:t>
+            </a:r>
+            <a:r>
+              <a:rPr lang="nl-NL" sz="900" dirty="0" smtClean="0"/>
+              <a:t>intercept vehicle</a:t>
+            </a:r>
+            <a:endParaRPr lang="nl-NL" sz="900" dirty="0" smtClean="0"/>
+          </a:p>
+          <a:p>
+            <a:r>
+              <a:rPr lang="nl-NL" sz="900" dirty="0" smtClean="0"/>
+              <a:t>RA – Refueling </a:t>
+            </a:r>
+            <a:r>
+              <a:rPr lang="nl-NL" sz="900" dirty="0" smtClean="0"/>
+              <a:t>action</a:t>
+            </a:r>
+            <a:endParaRPr lang="nl-NL" sz="900" dirty="0" smtClean="0"/>
+          </a:p>
+          <a:p>
+            <a:r>
+              <a:rPr lang="nl-NL" sz="900" dirty="0" smtClean="0"/>
+              <a:t>D </a:t>
+            </a:r>
+            <a:r>
+              <a:rPr lang="nl-NL" sz="900" dirty="0" smtClean="0"/>
+              <a:t>– </a:t>
+            </a:r>
+            <a:r>
+              <a:rPr lang="nl-NL" sz="900" dirty="0" smtClean="0"/>
+              <a:t>Destination smuggler’s go-fast</a:t>
+            </a:r>
+          </a:p>
+          <a:p>
+            <a:r>
+              <a:rPr lang="nl-NL" sz="900" dirty="0" smtClean="0"/>
+              <a:t>VO – </a:t>
+            </a:r>
+            <a:r>
+              <a:rPr lang="en-US" sz="900" dirty="0" smtClean="0"/>
+              <a:t>Visual observation go-fast</a:t>
+            </a:r>
+            <a:endParaRPr lang="en-US" sz="900" dirty="0"/>
+          </a:p>
+          <a:p>
+            <a:r>
+              <a:rPr lang="en-US" sz="900" dirty="0" smtClean="0"/>
+              <a:t>RO </a:t>
+            </a:r>
+            <a:r>
+              <a:rPr lang="en-US" sz="900" dirty="0" smtClean="0"/>
+              <a:t>– Radar observation go-fast</a:t>
+            </a:r>
+          </a:p>
+          <a:p>
+            <a:r>
+              <a:rPr lang="en-US" sz="900" dirty="0" smtClean="0"/>
+              <a:t>SO – Sonar observation go-fast</a:t>
+            </a:r>
+            <a:endParaRPr lang="en-US" sz="900" dirty="0"/>
+          </a:p>
+        </p:txBody>
+      </p:sp>
+      <p:sp>
+        <p:nvSpPr>
+          <p:cNvPr id="64" name="Oval 63"/>
+          <p:cNvSpPr/>
+          <p:nvPr/>
+        </p:nvSpPr>
+        <p:spPr>
+          <a:xfrm>
+            <a:off x="7426291" y="381374"/>
+            <a:ext cx="658291" cy="465221"/>
+          </a:xfrm>
+          <a:prstGeom prst="ellipse">
+            <a:avLst/>
+          </a:prstGeom>
+        </p:spPr>
+        <p:style>
+          <a:lnRef idx="2">
+            <a:schemeClr val="dk1"/>
+          </a:lnRef>
+          <a:fillRef idx="1">
+            <a:schemeClr val="lt1"/>
+          </a:fillRef>
+          <a:effectRef idx="0">
+            <a:schemeClr val="dk1"/>
+          </a:effectRef>
+          <a:fontRef idx="minor">
+            <a:schemeClr val="dk1"/>
+          </a:fontRef>
+        </p:style>
+        <p:txBody>
+          <a:bodyPr rtlCol="0" anchor="ctr"/>
+          <a:lstStyle/>
+          <a:p>
+            <a:pPr algn="ctr"/>
+            <a:r>
+              <a:rPr lang="en-US" sz="1000" dirty="0" smtClean="0">
+                <a:solidFill>
+                  <a:schemeClr val="tx1"/>
+                </a:solidFill>
+              </a:rPr>
+              <a:t>AF</a:t>
+            </a:r>
+            <a:endParaRPr lang="en-US" sz="1000" dirty="0">
+              <a:solidFill>
+                <a:schemeClr val="tx1"/>
+              </a:solidFill>
+            </a:endParaRPr>
+          </a:p>
+        </p:txBody>
+      </p:sp>
+      <p:sp>
+        <p:nvSpPr>
+          <p:cNvPr id="65" name="Oval 64"/>
+          <p:cNvSpPr/>
+          <p:nvPr/>
+        </p:nvSpPr>
+        <p:spPr>
+          <a:xfrm>
+            <a:off x="6570900" y="381374"/>
+            <a:ext cx="662585" cy="465221"/>
+          </a:xfrm>
+          <a:prstGeom prst="ellipse">
+            <a:avLst/>
+          </a:prstGeom>
+        </p:spPr>
+        <p:style>
+          <a:lnRef idx="2">
+            <a:schemeClr val="dk1"/>
+          </a:lnRef>
+          <a:fillRef idx="1">
+            <a:schemeClr val="lt1"/>
+          </a:fillRef>
+          <a:effectRef idx="0">
+            <a:schemeClr val="dk1"/>
+          </a:effectRef>
+          <a:fontRef idx="minor">
+            <a:schemeClr val="dk1"/>
+          </a:fontRef>
+        </p:style>
+        <p:txBody>
+          <a:bodyPr rtlCol="0" anchor="ctr"/>
+          <a:lstStyle/>
+          <a:p>
+            <a:pPr algn="ctr"/>
+            <a:r>
+              <a:rPr lang="en-US" sz="1000" dirty="0" smtClean="0">
+                <a:solidFill>
+                  <a:schemeClr val="tx1"/>
+                </a:solidFill>
+              </a:rPr>
+              <a:t>LR</a:t>
+            </a:r>
+            <a:endParaRPr lang="en-US" sz="1000" dirty="0">
+              <a:solidFill>
+                <a:schemeClr val="tx1"/>
+              </a:solidFill>
+            </a:endParaRPr>
+          </a:p>
+        </p:txBody>
+      </p:sp>
+      <p:sp>
+        <p:nvSpPr>
+          <p:cNvPr id="66" name="Oval 65"/>
+          <p:cNvSpPr/>
+          <p:nvPr/>
+        </p:nvSpPr>
+        <p:spPr>
+          <a:xfrm>
+            <a:off x="6668852" y="1570401"/>
+            <a:ext cx="618608" cy="465221"/>
+          </a:xfrm>
+          <a:prstGeom prst="ellipse">
+            <a:avLst/>
+          </a:prstGeom>
+        </p:spPr>
+        <p:style>
+          <a:lnRef idx="2">
+            <a:schemeClr val="dk1"/>
+          </a:lnRef>
+          <a:fillRef idx="1">
+            <a:schemeClr val="lt1"/>
+          </a:fillRef>
+          <a:effectRef idx="0">
+            <a:schemeClr val="dk1"/>
+          </a:effectRef>
+          <a:fontRef idx="minor">
+            <a:schemeClr val="dk1"/>
+          </a:fontRef>
+        </p:style>
+        <p:txBody>
+          <a:bodyPr rtlCol="0" anchor="ctr"/>
+          <a:lstStyle/>
+          <a:p>
+            <a:pPr algn="ctr"/>
+            <a:r>
+              <a:rPr lang="en-US" sz="1000" dirty="0" smtClean="0">
+                <a:solidFill>
+                  <a:schemeClr val="tx1"/>
+                </a:solidFill>
+              </a:rPr>
+              <a:t>RA</a:t>
+            </a:r>
+            <a:endParaRPr lang="en-US" sz="1000" dirty="0">
+              <a:solidFill>
+                <a:schemeClr val="tx1"/>
+              </a:solidFill>
+            </a:endParaRPr>
+          </a:p>
+        </p:txBody>
+      </p:sp>
+      <p:sp>
+        <p:nvSpPr>
+          <p:cNvPr id="67" name="Oval 66"/>
+          <p:cNvSpPr/>
+          <p:nvPr/>
+        </p:nvSpPr>
+        <p:spPr>
+          <a:xfrm>
+            <a:off x="5564172" y="381373"/>
+            <a:ext cx="608304" cy="465221"/>
+          </a:xfrm>
+          <a:prstGeom prst="ellipse">
+            <a:avLst/>
+          </a:prstGeom>
+        </p:spPr>
+        <p:style>
+          <a:lnRef idx="2">
+            <a:schemeClr val="dk1"/>
+          </a:lnRef>
+          <a:fillRef idx="1">
+            <a:schemeClr val="lt1"/>
+          </a:fillRef>
+          <a:effectRef idx="0">
+            <a:schemeClr val="dk1"/>
+          </a:effectRef>
+          <a:fontRef idx="minor">
+            <a:schemeClr val="dk1"/>
+          </a:fontRef>
+        </p:style>
+        <p:txBody>
+          <a:bodyPr rtlCol="0" anchor="ctr"/>
+          <a:lstStyle/>
+          <a:p>
+            <a:pPr algn="ctr"/>
+            <a:r>
+              <a:rPr lang="en-US" sz="1000" dirty="0" smtClean="0">
+                <a:solidFill>
+                  <a:schemeClr val="tx1"/>
+                </a:solidFill>
+              </a:rPr>
+              <a:t>D</a:t>
+            </a:r>
+            <a:endParaRPr lang="en-US" sz="1000" dirty="0">
+              <a:solidFill>
+                <a:schemeClr val="tx1"/>
+              </a:solidFill>
+            </a:endParaRPr>
+          </a:p>
+        </p:txBody>
+      </p:sp>
+      <p:sp>
+        <p:nvSpPr>
+          <p:cNvPr id="68" name="Oval 67"/>
+          <p:cNvSpPr/>
+          <p:nvPr/>
+        </p:nvSpPr>
+        <p:spPr>
+          <a:xfrm>
+            <a:off x="4119132" y="1555923"/>
+            <a:ext cx="570722" cy="465221"/>
+          </a:xfrm>
+          <a:prstGeom prst="ellipse">
+            <a:avLst/>
+          </a:prstGeom>
+        </p:spPr>
+        <p:style>
+          <a:lnRef idx="2">
+            <a:schemeClr val="dk1"/>
+          </a:lnRef>
+          <a:fillRef idx="1">
+            <a:schemeClr val="lt1"/>
+          </a:fillRef>
+          <a:effectRef idx="0">
+            <a:schemeClr val="dk1"/>
+          </a:effectRef>
+          <a:fontRef idx="minor">
+            <a:schemeClr val="dk1"/>
+          </a:fontRef>
+        </p:style>
+        <p:txBody>
+          <a:bodyPr rtlCol="0" anchor="ctr"/>
+          <a:lstStyle/>
+          <a:p>
+            <a:pPr algn="ctr"/>
+            <a:r>
+              <a:rPr lang="en-US" sz="1000" dirty="0" smtClean="0">
+                <a:solidFill>
+                  <a:schemeClr val="tx1"/>
+                </a:solidFill>
+              </a:rPr>
+              <a:t>LS</a:t>
+            </a:r>
+            <a:endParaRPr lang="en-US" sz="1000" dirty="0">
+              <a:solidFill>
+                <a:schemeClr val="tx1"/>
+              </a:solidFill>
+            </a:endParaRPr>
+          </a:p>
+        </p:txBody>
+      </p:sp>
+      <p:cxnSp>
+        <p:nvCxnSpPr>
+          <p:cNvPr id="69" name="Straight Arrow Connector 68"/>
+          <p:cNvCxnSpPr>
+            <a:stCxn id="68" idx="4"/>
+            <a:endCxn id="25" idx="1"/>
+          </p:cNvCxnSpPr>
+          <p:nvPr/>
+        </p:nvCxnSpPr>
+        <p:spPr>
+          <a:xfrm>
+            <a:off x="4404493" y="2021144"/>
+            <a:ext cx="1450638" cy="876562"/>
+          </a:xfrm>
+          <a:prstGeom prst="straightConnector1">
+            <a:avLst/>
+          </a:prstGeom>
+          <a:ln>
+            <a:headEnd type="none"/>
+            <a:tailEnd type="triangle" w="lg" len="med"/>
+          </a:ln>
+        </p:spPr>
+        <p:style>
+          <a:lnRef idx="2">
+            <a:schemeClr val="dk1"/>
+          </a:lnRef>
+          <a:fillRef idx="1">
+            <a:schemeClr val="lt1"/>
+          </a:fillRef>
+          <a:effectRef idx="0">
+            <a:schemeClr val="dk1"/>
+          </a:effectRef>
+          <a:fontRef idx="minor">
+            <a:schemeClr val="dk1"/>
+          </a:fontRef>
+        </p:style>
+      </p:cxnSp>
+      <mc:AlternateContent xmlns:mc="http://schemas.openxmlformats.org/markup-compatibility/2006">
+        <mc:Choice xmlns:a14="http://schemas.microsoft.com/office/drawing/2010/main" Requires="a14">
+          <p:sp>
+            <p:nvSpPr>
+              <p:cNvPr id="70" name="Oval 69"/>
+              <p:cNvSpPr/>
+              <p:nvPr/>
+            </p:nvSpPr>
+            <p:spPr>
+              <a:xfrm>
+                <a:off x="5107440" y="1570401"/>
+                <a:ext cx="630595" cy="465221"/>
+              </a:xfrm>
+              <a:prstGeom prst="ellipse">
+                <a:avLst/>
+              </a:prstGeom>
+            </p:spPr>
+            <p:style>
+              <a:lnRef idx="2">
+                <a:schemeClr val="dk1"/>
+              </a:lnRef>
+              <a:fillRef idx="1">
+                <a:schemeClr val="lt1"/>
+              </a:fillRef>
+              <a:effectRef idx="0">
+                <a:schemeClr val="dk1"/>
+              </a:effectRef>
+              <a:fontRef idx="minor">
+                <a:schemeClr val="dk1"/>
+              </a:fontRef>
+            </p:style>
+            <p:txBody>
+              <a:bodyPr rtlCol="0" anchor="ctr"/>
+              <a:lstStyle/>
+              <a:p>
+                <a:pPr algn="ctr"/>
+                <a14:m>
+                  <m:oMathPara xmlns:m="http://schemas.openxmlformats.org/officeDocument/2006/math">
+                    <m:oMathParaPr>
+                      <m:jc m:val="centerGroup"/>
+                    </m:oMathParaPr>
+                    <m:oMath xmlns:m="http://schemas.openxmlformats.org/officeDocument/2006/math">
+                      <m:r>
+                        <a:rPr lang="en-US" sz="1000" b="0" i="1" smtClean="0">
+                          <a:solidFill>
+                            <a:schemeClr val="tx1"/>
+                          </a:solidFill>
+                          <a:latin typeface="Cambria Math" panose="02040503050406030204" pitchFamily="18" charset="0"/>
+                        </a:rPr>
+                        <m:t>𝐿𝑃</m:t>
+                      </m:r>
+                    </m:oMath>
+                  </m:oMathPara>
+                </a14:m>
+                <a:endParaRPr lang="en-US" sz="1000" dirty="0">
+                  <a:solidFill>
+                    <a:schemeClr val="tx1"/>
+                  </a:solidFill>
+                </a:endParaRPr>
+              </a:p>
+            </p:txBody>
+          </p:sp>
+        </mc:Choice>
+        <mc:Fallback>
+          <p:sp>
+            <p:nvSpPr>
+              <p:cNvPr id="70" name="Oval 69"/>
+              <p:cNvSpPr>
+                <a:spLocks noRot="1" noChangeAspect="1" noMove="1" noResize="1" noEditPoints="1" noAdjustHandles="1" noChangeArrowheads="1" noChangeShapeType="1" noTextEdit="1"/>
+              </p:cNvSpPr>
+              <p:nvPr/>
+            </p:nvSpPr>
+            <p:spPr>
+              <a:xfrm>
+                <a:off x="5107440" y="1570401"/>
+                <a:ext cx="630595" cy="465221"/>
+              </a:xfrm>
+              <a:prstGeom prst="ellipse">
+                <a:avLst/>
+              </a:prstGeom>
+              <a:blipFill rotWithShape="0">
+                <a:blip r:embed="rId2"/>
+                <a:stretch>
+                  <a:fillRect/>
                 </a:stretch>
               </a:blipFill>
             </p:spPr>
@@ -4709,55 +6964,70 @@
         <mc:Choice xmlns:a14="http://schemas.microsoft.com/office/drawing/2010/main" Requires="a14">
           <p:sp>
             <p:nvSpPr>
-              <p:cNvPr id="75" name="TextBox 74"/>
-              <p:cNvSpPr txBox="1"/>
+              <p:cNvPr id="102" name="Oval 101"/>
+              <p:cNvSpPr/>
               <p:nvPr/>
             </p:nvSpPr>
             <p:spPr>
               <a:xfrm>
-                <a:off x="2370171" y="5301390"/>
-                <a:ext cx="6541682" cy="1200329"/>
+                <a:off x="2804136" y="2754874"/>
+                <a:ext cx="551635" cy="465221"/>
               </a:xfrm>
-              <a:prstGeom prst="rect">
+              <a:prstGeom prst="ellipse">
                 <a:avLst/>
               </a:prstGeom>
-              <a:noFill/>
             </p:spPr>
+            <p:style>
+              <a:lnRef idx="2">
+                <a:schemeClr val="dk1"/>
+              </a:lnRef>
+              <a:fillRef idx="1">
+                <a:schemeClr val="lt1"/>
+              </a:fillRef>
+              <a:effectRef idx="0">
+                <a:schemeClr val="dk1"/>
+              </a:effectRef>
+              <a:fontRef idx="minor">
+                <a:schemeClr val="dk1"/>
+              </a:fontRef>
+            </p:style>
             <p:txBody>
-              <a:bodyPr wrap="square" rtlCol="0">
-                <a:spAutoFit/>
-              </a:bodyPr>
+              <a:bodyPr rtlCol="0" anchor="ctr"/>
               <a:lstStyle/>
               <a:p>
+                <a:pPr algn="ctr"/>
                 <a14:m>
-                  <m:oMath xmlns:m="http://schemas.openxmlformats.org/officeDocument/2006/math">
-                    <m:r>
-                      <a:rPr lang="en-US" b="0" i="1" smtClean="0">
-                        <a:latin typeface="Cambria Math" panose="02040503050406030204" pitchFamily="18" charset="0"/>
-                      </a:rPr>
-                      <m:t>𝛼</m:t>
-                    </m:r>
-                  </m:oMath>
+                  <m:oMathPara xmlns:m="http://schemas.openxmlformats.org/officeDocument/2006/math">
+                    <m:oMathParaPr>
+                      <m:jc m:val="centerGroup"/>
+                    </m:oMathParaPr>
+                    <m:oMath xmlns:m="http://schemas.openxmlformats.org/officeDocument/2006/math">
+                      <m:r>
+                        <a:rPr lang="en-US" sz="1000" i="1" smtClean="0">
+                          <a:solidFill>
+                            <a:schemeClr val="tx1"/>
+                          </a:solidFill>
+                          <a:latin typeface="Cambria Math" panose="02040503050406030204" pitchFamily="18" charset="0"/>
+                        </a:rPr>
+                        <m:t>𝑉</m:t>
+                      </m:r>
+                      <m:r>
+                        <a:rPr lang="en-US" sz="1000" b="0" i="1" smtClean="0">
+                          <a:solidFill>
+                            <a:schemeClr val="tx1"/>
+                          </a:solidFill>
+                          <a:latin typeface="Cambria Math" panose="02040503050406030204" pitchFamily="18" charset="0"/>
+                        </a:rPr>
+                        <m:t>𝑂</m:t>
+                      </m:r>
+                    </m:oMath>
+                  </m:oMathPara>
                 </a14:m>
-                <a:r>
-                  <a:rPr lang="en-US" dirty="0" smtClean="0"/>
-                  <a:t> in the utility function is used to weight the utility such that either decisions are more supportive towards chasing the smuggler or towards strategic positioning to rendezvous with the smuggler. The choice of </a:t>
-                </a:r>
-                <a14:m>
-                  <m:oMath xmlns:m="http://schemas.openxmlformats.org/officeDocument/2006/math">
-                    <m:r>
-                      <a:rPr lang="en-US" i="1">
-                        <a:latin typeface="Cambria Math" panose="02040503050406030204" pitchFamily="18" charset="0"/>
-                      </a:rPr>
-                      <m:t>𝛼</m:t>
-                    </m:r>
-                  </m:oMath>
-                </a14:m>
-                <a:r>
-                  <a:rPr lang="en-US" dirty="0" smtClean="0"/>
-                  <a:t> depends on the domain and the available observations</a:t>
-                </a:r>
-                <a:endParaRPr lang="en-US" dirty="0"/>
+                <a:endParaRPr lang="en-US" sz="1000" dirty="0">
+                  <a:solidFill>
+                    <a:schemeClr val="tx1"/>
+                  </a:solidFill>
+                </a:endParaRPr>
               </a:p>
             </p:txBody>
           </p:sp>
@@ -4765,24 +7035,24 @@
         <mc:Fallback>
           <p:sp>
             <p:nvSpPr>
-              <p:cNvPr id="75" name="TextBox 74"/>
-              <p:cNvSpPr txBox="1">
+              <p:cNvPr id="102" name="Oval 101"/>
+              <p:cNvSpPr>
                 <a:spLocks noRot="1" noChangeAspect="1" noMove="1" noResize="1" noEditPoints="1" noAdjustHandles="1" noChangeArrowheads="1" noChangeShapeType="1" noTextEdit="1"/>
               </p:cNvSpPr>
               <p:nvPr/>
             </p:nvSpPr>
             <p:spPr>
               <a:xfrm>
-                <a:off x="2370171" y="5301390"/>
-                <a:ext cx="6541682" cy="1200329"/>
+                <a:off x="2804136" y="2754874"/>
+                <a:ext cx="551635" cy="465221"/>
               </a:xfrm>
-              <a:prstGeom prst="rect">
+              <a:prstGeom prst="ellipse">
                 <a:avLst/>
               </a:prstGeom>
               <a:blipFill rotWithShape="0">
-                <a:blip r:embed="rId7"/>
+                <a:blip r:embed="rId3"/>
                 <a:stretch>
-                  <a:fillRect l="-839" t="-3046" b="-7107"/>
+                  <a:fillRect/>
                 </a:stretch>
               </a:blipFill>
             </p:spPr>
@@ -4801,10 +7071,615 @@
           </p:sp>
         </mc:Fallback>
       </mc:AlternateContent>
+      <p:cxnSp>
+        <p:nvCxnSpPr>
+          <p:cNvPr id="103" name="Straight Arrow Connector 102"/>
+          <p:cNvCxnSpPr>
+            <a:stCxn id="68" idx="4"/>
+            <a:endCxn id="102" idx="0"/>
+          </p:cNvCxnSpPr>
+          <p:nvPr/>
+        </p:nvCxnSpPr>
+        <p:spPr>
+          <a:xfrm flipH="1">
+            <a:off x="3079954" y="2021144"/>
+            <a:ext cx="1324539" cy="733730"/>
+          </a:xfrm>
+          <a:prstGeom prst="straightConnector1">
+            <a:avLst/>
+          </a:prstGeom>
+          <a:ln>
+            <a:headEnd type="none"/>
+            <a:tailEnd type="triangle" w="lg" len="med"/>
+          </a:ln>
+        </p:spPr>
+        <p:style>
+          <a:lnRef idx="2">
+            <a:schemeClr val="dk1"/>
+          </a:lnRef>
+          <a:fillRef idx="1">
+            <a:schemeClr val="lt1"/>
+          </a:fillRef>
+          <a:effectRef idx="0">
+            <a:schemeClr val="dk1"/>
+          </a:effectRef>
+          <a:fontRef idx="minor">
+            <a:schemeClr val="dk1"/>
+          </a:fontRef>
+        </p:style>
+      </p:cxnSp>
+      <mc:AlternateContent xmlns:mc="http://schemas.openxmlformats.org/markup-compatibility/2006">
+        <mc:Choice xmlns:a14="http://schemas.microsoft.com/office/drawing/2010/main" Requires="a14">
+          <p:sp>
+            <p:nvSpPr>
+              <p:cNvPr id="104" name="Oval 103"/>
+              <p:cNvSpPr/>
+              <p:nvPr/>
+            </p:nvSpPr>
+            <p:spPr>
+              <a:xfrm>
+                <a:off x="3544532" y="2754875"/>
+                <a:ext cx="574600" cy="465221"/>
+              </a:xfrm>
+              <a:prstGeom prst="ellipse">
+                <a:avLst/>
+              </a:prstGeom>
+            </p:spPr>
+            <p:style>
+              <a:lnRef idx="2">
+                <a:schemeClr val="dk1"/>
+              </a:lnRef>
+              <a:fillRef idx="1">
+                <a:schemeClr val="lt1"/>
+              </a:fillRef>
+              <a:effectRef idx="0">
+                <a:schemeClr val="dk1"/>
+              </a:effectRef>
+              <a:fontRef idx="minor">
+                <a:schemeClr val="dk1"/>
+              </a:fontRef>
+            </p:style>
+            <p:txBody>
+              <a:bodyPr rtlCol="0" anchor="ctr"/>
+              <a:lstStyle/>
+              <a:p>
+                <a:pPr algn="ctr"/>
+                <a14:m>
+                  <m:oMathPara xmlns:m="http://schemas.openxmlformats.org/officeDocument/2006/math">
+                    <m:oMathParaPr>
+                      <m:jc m:val="centerGroup"/>
+                    </m:oMathParaPr>
+                    <m:oMath xmlns:m="http://schemas.openxmlformats.org/officeDocument/2006/math">
+                      <m:r>
+                        <a:rPr lang="en-US" sz="1000" i="1" smtClean="0">
+                          <a:solidFill>
+                            <a:schemeClr val="tx1"/>
+                          </a:solidFill>
+                          <a:latin typeface="Cambria Math" panose="02040503050406030204" pitchFamily="18" charset="0"/>
+                        </a:rPr>
+                        <m:t>𝑅</m:t>
+                      </m:r>
+                      <m:r>
+                        <a:rPr lang="en-US" sz="1000" b="0" i="1" smtClean="0">
+                          <a:solidFill>
+                            <a:schemeClr val="tx1"/>
+                          </a:solidFill>
+                          <a:latin typeface="Cambria Math" panose="02040503050406030204" pitchFamily="18" charset="0"/>
+                        </a:rPr>
+                        <m:t>𝑂</m:t>
+                      </m:r>
+                    </m:oMath>
+                  </m:oMathPara>
+                </a14:m>
+                <a:endParaRPr lang="en-US" sz="1000" dirty="0">
+                  <a:solidFill>
+                    <a:schemeClr val="tx1"/>
+                  </a:solidFill>
+                </a:endParaRPr>
+              </a:p>
+            </p:txBody>
+          </p:sp>
+        </mc:Choice>
+        <mc:Fallback>
+          <p:sp>
+            <p:nvSpPr>
+              <p:cNvPr id="104" name="Oval 103"/>
+              <p:cNvSpPr>
+                <a:spLocks noRot="1" noChangeAspect="1" noMove="1" noResize="1" noEditPoints="1" noAdjustHandles="1" noChangeArrowheads="1" noChangeShapeType="1" noTextEdit="1"/>
+              </p:cNvSpPr>
+              <p:nvPr/>
+            </p:nvSpPr>
+            <p:spPr>
+              <a:xfrm>
+                <a:off x="3544532" y="2754875"/>
+                <a:ext cx="574600" cy="465221"/>
+              </a:xfrm>
+              <a:prstGeom prst="ellipse">
+                <a:avLst/>
+              </a:prstGeom>
+              <a:blipFill rotWithShape="0">
+                <a:blip r:embed="rId4"/>
+                <a:stretch>
+                  <a:fillRect/>
+                </a:stretch>
+              </a:blipFill>
+            </p:spPr>
+            <p:txBody>
+              <a:bodyPr/>
+              <a:lstStyle/>
+              <a:p>
+                <a:r>
+                  <a:rPr lang="en-US">
+                    <a:noFill/>
+                  </a:rPr>
+                  <a:t> </a:t>
+                </a:r>
+              </a:p>
+            </p:txBody>
+          </p:sp>
+        </mc:Fallback>
+      </mc:AlternateContent>
+      <p:cxnSp>
+        <p:nvCxnSpPr>
+          <p:cNvPr id="105" name="Straight Arrow Connector 104"/>
+          <p:cNvCxnSpPr>
+            <a:stCxn id="68" idx="4"/>
+            <a:endCxn id="104" idx="0"/>
+          </p:cNvCxnSpPr>
+          <p:nvPr/>
+        </p:nvCxnSpPr>
+        <p:spPr>
+          <a:xfrm flipH="1">
+            <a:off x="3831832" y="2021144"/>
+            <a:ext cx="572661" cy="733731"/>
+          </a:xfrm>
+          <a:prstGeom prst="straightConnector1">
+            <a:avLst/>
+          </a:prstGeom>
+          <a:ln>
+            <a:headEnd type="none"/>
+            <a:tailEnd type="triangle" w="lg" len="med"/>
+          </a:ln>
+        </p:spPr>
+        <p:style>
+          <a:lnRef idx="2">
+            <a:schemeClr val="dk1"/>
+          </a:lnRef>
+          <a:fillRef idx="1">
+            <a:schemeClr val="lt1"/>
+          </a:fillRef>
+          <a:effectRef idx="0">
+            <a:schemeClr val="dk1"/>
+          </a:effectRef>
+          <a:fontRef idx="minor">
+            <a:schemeClr val="dk1"/>
+          </a:fontRef>
+        </p:style>
+      </p:cxnSp>
+      <p:cxnSp>
+        <p:nvCxnSpPr>
+          <p:cNvPr id="107" name="Straight Arrow Connector 106"/>
+          <p:cNvCxnSpPr>
+            <a:stCxn id="66" idx="4"/>
+            <a:endCxn id="25" idx="7"/>
+          </p:cNvCxnSpPr>
+          <p:nvPr/>
+        </p:nvCxnSpPr>
+        <p:spPr>
+          <a:xfrm flipH="1">
+            <a:off x="6323650" y="2035622"/>
+            <a:ext cx="654506" cy="862084"/>
+          </a:xfrm>
+          <a:prstGeom prst="straightConnector1">
+            <a:avLst/>
+          </a:prstGeom>
+          <a:ln>
+            <a:headEnd type="none"/>
+            <a:tailEnd type="triangle" w="lg" len="med"/>
+          </a:ln>
+        </p:spPr>
+        <p:style>
+          <a:lnRef idx="2">
+            <a:schemeClr val="dk1"/>
+          </a:lnRef>
+          <a:fillRef idx="1">
+            <a:schemeClr val="lt1"/>
+          </a:fillRef>
+          <a:effectRef idx="0">
+            <a:schemeClr val="dk1"/>
+          </a:effectRef>
+          <a:fontRef idx="minor">
+            <a:schemeClr val="dk1"/>
+          </a:fontRef>
+        </p:style>
+      </p:cxnSp>
+      <p:cxnSp>
+        <p:nvCxnSpPr>
+          <p:cNvPr id="108" name="Straight Arrow Connector 107"/>
+          <p:cNvCxnSpPr>
+            <a:stCxn id="67" idx="4"/>
+            <a:endCxn id="66" idx="1"/>
+          </p:cNvCxnSpPr>
+          <p:nvPr/>
+        </p:nvCxnSpPr>
+        <p:spPr>
+          <a:xfrm>
+            <a:off x="5868324" y="846594"/>
+            <a:ext cx="891121" cy="791937"/>
+          </a:xfrm>
+          <a:prstGeom prst="straightConnector1">
+            <a:avLst/>
+          </a:prstGeom>
+          <a:ln>
+            <a:headEnd type="none"/>
+            <a:tailEnd type="triangle" w="lg" len="med"/>
+          </a:ln>
+        </p:spPr>
+        <p:style>
+          <a:lnRef idx="2">
+            <a:schemeClr val="dk1"/>
+          </a:lnRef>
+          <a:fillRef idx="1">
+            <a:schemeClr val="lt1"/>
+          </a:fillRef>
+          <a:effectRef idx="0">
+            <a:schemeClr val="dk1"/>
+          </a:effectRef>
+          <a:fontRef idx="minor">
+            <a:schemeClr val="dk1"/>
+          </a:fontRef>
+        </p:style>
+      </p:cxnSp>
+      <p:cxnSp>
+        <p:nvCxnSpPr>
+          <p:cNvPr id="109" name="Straight Arrow Connector 108"/>
+          <p:cNvCxnSpPr>
+            <a:stCxn id="65" idx="4"/>
+            <a:endCxn id="66" idx="0"/>
+          </p:cNvCxnSpPr>
+          <p:nvPr/>
+        </p:nvCxnSpPr>
+        <p:spPr>
+          <a:xfrm>
+            <a:off x="6902193" y="846595"/>
+            <a:ext cx="75963" cy="723806"/>
+          </a:xfrm>
+          <a:prstGeom prst="straightConnector1">
+            <a:avLst/>
+          </a:prstGeom>
+          <a:ln>
+            <a:headEnd type="none"/>
+            <a:tailEnd type="triangle" w="lg" len="med"/>
+          </a:ln>
+        </p:spPr>
+        <p:style>
+          <a:lnRef idx="2">
+            <a:schemeClr val="dk1"/>
+          </a:lnRef>
+          <a:fillRef idx="1">
+            <a:schemeClr val="lt1"/>
+          </a:fillRef>
+          <a:effectRef idx="0">
+            <a:schemeClr val="dk1"/>
+          </a:effectRef>
+          <a:fontRef idx="minor">
+            <a:schemeClr val="dk1"/>
+          </a:fontRef>
+        </p:style>
+      </p:cxnSp>
+      <p:cxnSp>
+        <p:nvCxnSpPr>
+          <p:cNvPr id="111" name="Straight Arrow Connector 110"/>
+          <p:cNvCxnSpPr>
+            <a:stCxn id="64" idx="4"/>
+            <a:endCxn id="66" idx="7"/>
+          </p:cNvCxnSpPr>
+          <p:nvPr/>
+        </p:nvCxnSpPr>
+        <p:spPr>
+          <a:xfrm flipH="1">
+            <a:off x="7196867" y="846595"/>
+            <a:ext cx="558570" cy="791936"/>
+          </a:xfrm>
+          <a:prstGeom prst="straightConnector1">
+            <a:avLst/>
+          </a:prstGeom>
+          <a:ln>
+            <a:headEnd type="none"/>
+            <a:tailEnd type="triangle" w="lg" len="med"/>
+          </a:ln>
+        </p:spPr>
+        <p:style>
+          <a:lnRef idx="2">
+            <a:schemeClr val="dk1"/>
+          </a:lnRef>
+          <a:fillRef idx="1">
+            <a:schemeClr val="lt1"/>
+          </a:fillRef>
+          <a:effectRef idx="0">
+            <a:schemeClr val="dk1"/>
+          </a:effectRef>
+          <a:fontRef idx="minor">
+            <a:schemeClr val="dk1"/>
+          </a:fontRef>
+        </p:style>
+      </p:cxnSp>
+      <p:cxnSp>
+        <p:nvCxnSpPr>
+          <p:cNvPr id="114" name="Straight Arrow Connector 113"/>
+          <p:cNvCxnSpPr>
+            <a:stCxn id="70" idx="4"/>
+            <a:endCxn id="25" idx="0"/>
+          </p:cNvCxnSpPr>
+          <p:nvPr/>
+        </p:nvCxnSpPr>
+        <p:spPr>
+          <a:xfrm>
+            <a:off x="5422738" y="2035622"/>
+            <a:ext cx="666653" cy="793954"/>
+          </a:xfrm>
+          <a:prstGeom prst="straightConnector1">
+            <a:avLst/>
+          </a:prstGeom>
+          <a:ln>
+            <a:headEnd type="none"/>
+            <a:tailEnd type="triangle" w="lg" len="med"/>
+          </a:ln>
+        </p:spPr>
+        <p:style>
+          <a:lnRef idx="2">
+            <a:schemeClr val="dk1"/>
+          </a:lnRef>
+          <a:fillRef idx="1">
+            <a:schemeClr val="lt1"/>
+          </a:fillRef>
+          <a:effectRef idx="0">
+            <a:schemeClr val="dk1"/>
+          </a:effectRef>
+          <a:fontRef idx="minor">
+            <a:schemeClr val="dk1"/>
+          </a:fontRef>
+        </p:style>
+      </p:cxnSp>
+      <p:sp>
+        <p:nvSpPr>
+          <p:cNvPr id="25" name="Oval 24"/>
+          <p:cNvSpPr/>
+          <p:nvPr/>
+        </p:nvSpPr>
+        <p:spPr>
+          <a:xfrm>
+            <a:off x="5758098" y="2829576"/>
+            <a:ext cx="662585" cy="465221"/>
+          </a:xfrm>
+          <a:prstGeom prst="ellipse">
+            <a:avLst/>
+          </a:prstGeom>
+        </p:spPr>
+        <p:style>
+          <a:lnRef idx="2">
+            <a:schemeClr val="dk1"/>
+          </a:lnRef>
+          <a:fillRef idx="1">
+            <a:schemeClr val="lt1"/>
+          </a:fillRef>
+          <a:effectRef idx="0">
+            <a:schemeClr val="dk1"/>
+          </a:effectRef>
+          <a:fontRef idx="minor">
+            <a:schemeClr val="dk1"/>
+          </a:fontRef>
+        </p:style>
+        <p:txBody>
+          <a:bodyPr rtlCol="0" anchor="ctr"/>
+          <a:lstStyle/>
+          <a:p>
+            <a:pPr algn="ctr"/>
+            <a:r>
+              <a:rPr lang="en-US" sz="1000" dirty="0" smtClean="0">
+                <a:solidFill>
+                  <a:schemeClr val="tx1"/>
+                </a:solidFill>
+              </a:rPr>
+              <a:t>IA</a:t>
+            </a:r>
+            <a:endParaRPr lang="en-US" sz="1000" dirty="0">
+              <a:solidFill>
+                <a:schemeClr val="tx1"/>
+              </a:solidFill>
+            </a:endParaRPr>
+          </a:p>
+        </p:txBody>
+      </p:sp>
+      <p:cxnSp>
+        <p:nvCxnSpPr>
+          <p:cNvPr id="30" name="Straight Arrow Connector 29"/>
+          <p:cNvCxnSpPr>
+            <a:stCxn id="67" idx="4"/>
+            <a:endCxn id="68" idx="0"/>
+          </p:cNvCxnSpPr>
+          <p:nvPr/>
+        </p:nvCxnSpPr>
+        <p:spPr>
+          <a:xfrm flipH="1">
+            <a:off x="4404493" y="846594"/>
+            <a:ext cx="1463831" cy="709329"/>
+          </a:xfrm>
+          <a:prstGeom prst="straightConnector1">
+            <a:avLst/>
+          </a:prstGeom>
+          <a:ln>
+            <a:headEnd type="none"/>
+            <a:tailEnd type="triangle" w="lg" len="med"/>
+          </a:ln>
+        </p:spPr>
+        <p:style>
+          <a:lnRef idx="2">
+            <a:schemeClr val="dk1"/>
+          </a:lnRef>
+          <a:fillRef idx="1">
+            <a:schemeClr val="lt1"/>
+          </a:fillRef>
+          <a:effectRef idx="0">
+            <a:schemeClr val="dk1"/>
+          </a:effectRef>
+          <a:fontRef idx="minor">
+            <a:schemeClr val="dk1"/>
+          </a:fontRef>
+        </p:style>
+      </p:cxnSp>
+      <mc:AlternateContent xmlns:mc="http://schemas.openxmlformats.org/markup-compatibility/2006">
+        <mc:Choice xmlns:a14="http://schemas.microsoft.com/office/drawing/2010/main" Requires="a14">
+          <p:sp>
+            <p:nvSpPr>
+              <p:cNvPr id="40" name="Oval 39"/>
+              <p:cNvSpPr/>
+              <p:nvPr/>
+            </p:nvSpPr>
+            <p:spPr>
+              <a:xfrm>
+                <a:off x="4255890" y="2761150"/>
+                <a:ext cx="574600" cy="465221"/>
+              </a:xfrm>
+              <a:prstGeom prst="ellipse">
+                <a:avLst/>
+              </a:prstGeom>
+            </p:spPr>
+            <p:style>
+              <a:lnRef idx="2">
+                <a:schemeClr val="dk1"/>
+              </a:lnRef>
+              <a:fillRef idx="1">
+                <a:schemeClr val="lt1"/>
+              </a:fillRef>
+              <a:effectRef idx="0">
+                <a:schemeClr val="dk1"/>
+              </a:effectRef>
+              <a:fontRef idx="minor">
+                <a:schemeClr val="dk1"/>
+              </a:fontRef>
+            </p:style>
+            <p:txBody>
+              <a:bodyPr rtlCol="0" anchor="ctr"/>
+              <a:lstStyle/>
+              <a:p>
+                <a:pPr algn="ctr"/>
+                <a14:m>
+                  <m:oMathPara xmlns:m="http://schemas.openxmlformats.org/officeDocument/2006/math">
+                    <m:oMathParaPr>
+                      <m:jc m:val="centerGroup"/>
+                    </m:oMathParaPr>
+                    <m:oMath xmlns:m="http://schemas.openxmlformats.org/officeDocument/2006/math">
+                      <m:r>
+                        <a:rPr lang="en-US" sz="1000" b="0" i="1" smtClean="0">
+                          <a:solidFill>
+                            <a:schemeClr val="tx1"/>
+                          </a:solidFill>
+                          <a:latin typeface="Cambria Math" panose="02040503050406030204" pitchFamily="18" charset="0"/>
+                        </a:rPr>
+                        <m:t>𝑆</m:t>
+                      </m:r>
+                      <m:r>
+                        <a:rPr lang="en-US" sz="1000" b="0" i="1" smtClean="0">
+                          <a:solidFill>
+                            <a:schemeClr val="tx1"/>
+                          </a:solidFill>
+                          <a:latin typeface="Cambria Math" panose="02040503050406030204" pitchFamily="18" charset="0"/>
+                        </a:rPr>
+                        <m:t>𝑂</m:t>
+                      </m:r>
+                    </m:oMath>
+                  </m:oMathPara>
+                </a14:m>
+                <a:endParaRPr lang="en-US" sz="1000" dirty="0">
+                  <a:solidFill>
+                    <a:schemeClr val="tx1"/>
+                  </a:solidFill>
+                </a:endParaRPr>
+              </a:p>
+            </p:txBody>
+          </p:sp>
+        </mc:Choice>
+        <mc:Fallback>
+          <p:sp>
+            <p:nvSpPr>
+              <p:cNvPr id="40" name="Oval 39"/>
+              <p:cNvSpPr>
+                <a:spLocks noRot="1" noChangeAspect="1" noMove="1" noResize="1" noEditPoints="1" noAdjustHandles="1" noChangeArrowheads="1" noChangeShapeType="1" noTextEdit="1"/>
+              </p:cNvSpPr>
+              <p:nvPr/>
+            </p:nvSpPr>
+            <p:spPr>
+              <a:xfrm>
+                <a:off x="4255890" y="2761150"/>
+                <a:ext cx="574600" cy="465221"/>
+              </a:xfrm>
+              <a:prstGeom prst="ellipse">
+                <a:avLst/>
+              </a:prstGeom>
+              <a:blipFill rotWithShape="0">
+                <a:blip r:embed="rId5"/>
+                <a:stretch>
+                  <a:fillRect/>
+                </a:stretch>
+              </a:blipFill>
+            </p:spPr>
+            <p:txBody>
+              <a:bodyPr/>
+              <a:lstStyle/>
+              <a:p>
+                <a:r>
+                  <a:rPr lang="en-US">
+                    <a:noFill/>
+                  </a:rPr>
+                  <a:t> </a:t>
+                </a:r>
+              </a:p>
+            </p:txBody>
+          </p:sp>
+        </mc:Fallback>
+      </mc:AlternateContent>
+      <p:cxnSp>
+        <p:nvCxnSpPr>
+          <p:cNvPr id="41" name="Straight Arrow Connector 40"/>
+          <p:cNvCxnSpPr>
+            <a:stCxn id="68" idx="4"/>
+            <a:endCxn id="40" idx="0"/>
+          </p:cNvCxnSpPr>
+          <p:nvPr/>
+        </p:nvCxnSpPr>
+        <p:spPr>
+          <a:xfrm>
+            <a:off x="4404493" y="2021144"/>
+            <a:ext cx="138697" cy="740006"/>
+          </a:xfrm>
+          <a:prstGeom prst="straightConnector1">
+            <a:avLst/>
+          </a:prstGeom>
+          <a:ln>
+            <a:headEnd type="none"/>
+            <a:tailEnd type="triangle" w="lg" len="med"/>
+          </a:ln>
+        </p:spPr>
+        <p:style>
+          <a:lnRef idx="2">
+            <a:schemeClr val="dk1"/>
+          </a:lnRef>
+          <a:fillRef idx="1">
+            <a:schemeClr val="lt1"/>
+          </a:fillRef>
+          <a:effectRef idx="0">
+            <a:schemeClr val="dk1"/>
+          </a:effectRef>
+          <a:fontRef idx="minor">
+            <a:schemeClr val="dk1"/>
+          </a:fontRef>
+        </p:style>
+      </p:cxnSp>
     </p:spTree>
     <p:extLst>
       <p:ext uri="{BB962C8B-B14F-4D97-AF65-F5344CB8AC3E}">
-        <p14:creationId xmlns:p14="http://schemas.microsoft.com/office/powerpoint/2010/main" val="2788344332"/>
+        <p14:creationId xmlns:p14="http://schemas.microsoft.com/office/powerpoint/2010/main" val="3509373446"/>
       </p:ext>
     </p:extLst>
   </p:cSld>

</xml_diff>